<commit_message>
Finished requirements picture order and also and all finished GUI pictures to be added to the end of the requirements document
</commit_message>
<xml_diff>
--- a/doc/requiremnetsPics.pptx
+++ b/doc/requiremnetsPics.pptx
@@ -251,7 +251,7 @@
           <a:p>
             <a:fld id="{CF664A69-AE03-460E-A7AB-D964A2854FD9}" type="datetimeFigureOut">
               <a:rPr lang="en-CA" smtClean="0"/>
-              <a:t>2016-09-28</a:t>
+              <a:t>2016-09-30</a:t>
             </a:fld>
             <a:endParaRPr lang="en-CA"/>
           </a:p>
@@ -421,7 +421,7 @@
           <a:p>
             <a:fld id="{CF664A69-AE03-460E-A7AB-D964A2854FD9}" type="datetimeFigureOut">
               <a:rPr lang="en-CA" smtClean="0"/>
-              <a:t>2016-09-28</a:t>
+              <a:t>2016-09-30</a:t>
             </a:fld>
             <a:endParaRPr lang="en-CA"/>
           </a:p>
@@ -601,7 +601,7 @@
           <a:p>
             <a:fld id="{CF664A69-AE03-460E-A7AB-D964A2854FD9}" type="datetimeFigureOut">
               <a:rPr lang="en-CA" smtClean="0"/>
-              <a:t>2016-09-28</a:t>
+              <a:t>2016-09-30</a:t>
             </a:fld>
             <a:endParaRPr lang="en-CA"/>
           </a:p>
@@ -771,7 +771,7 @@
           <a:p>
             <a:fld id="{CF664A69-AE03-460E-A7AB-D964A2854FD9}" type="datetimeFigureOut">
               <a:rPr lang="en-CA" smtClean="0"/>
-              <a:t>2016-09-28</a:t>
+              <a:t>2016-09-30</a:t>
             </a:fld>
             <a:endParaRPr lang="en-CA"/>
           </a:p>
@@ -1017,7 +1017,7 @@
           <a:p>
             <a:fld id="{CF664A69-AE03-460E-A7AB-D964A2854FD9}" type="datetimeFigureOut">
               <a:rPr lang="en-CA" smtClean="0"/>
-              <a:t>2016-09-28</a:t>
+              <a:t>2016-09-30</a:t>
             </a:fld>
             <a:endParaRPr lang="en-CA"/>
           </a:p>
@@ -1249,7 +1249,7 @@
           <a:p>
             <a:fld id="{CF664A69-AE03-460E-A7AB-D964A2854FD9}" type="datetimeFigureOut">
               <a:rPr lang="en-CA" smtClean="0"/>
-              <a:t>2016-09-28</a:t>
+              <a:t>2016-09-30</a:t>
             </a:fld>
             <a:endParaRPr lang="en-CA"/>
           </a:p>
@@ -1616,7 +1616,7 @@
           <a:p>
             <a:fld id="{CF664A69-AE03-460E-A7AB-D964A2854FD9}" type="datetimeFigureOut">
               <a:rPr lang="en-CA" smtClean="0"/>
-              <a:t>2016-09-28</a:t>
+              <a:t>2016-09-30</a:t>
             </a:fld>
             <a:endParaRPr lang="en-CA"/>
           </a:p>
@@ -1734,7 +1734,7 @@
           <a:p>
             <a:fld id="{CF664A69-AE03-460E-A7AB-D964A2854FD9}" type="datetimeFigureOut">
               <a:rPr lang="en-CA" smtClean="0"/>
-              <a:t>2016-09-28</a:t>
+              <a:t>2016-09-30</a:t>
             </a:fld>
             <a:endParaRPr lang="en-CA"/>
           </a:p>
@@ -1829,7 +1829,7 @@
           <a:p>
             <a:fld id="{CF664A69-AE03-460E-A7AB-D964A2854FD9}" type="datetimeFigureOut">
               <a:rPr lang="en-CA" smtClean="0"/>
-              <a:t>2016-09-28</a:t>
+              <a:t>2016-09-30</a:t>
             </a:fld>
             <a:endParaRPr lang="en-CA"/>
           </a:p>
@@ -2106,7 +2106,7 @@
           <a:p>
             <a:fld id="{CF664A69-AE03-460E-A7AB-D964A2854FD9}" type="datetimeFigureOut">
               <a:rPr lang="en-CA" smtClean="0"/>
-              <a:t>2016-09-28</a:t>
+              <a:t>2016-09-30</a:t>
             </a:fld>
             <a:endParaRPr lang="en-CA"/>
           </a:p>
@@ -2359,7 +2359,7 @@
           <a:p>
             <a:fld id="{CF664A69-AE03-460E-A7AB-D964A2854FD9}" type="datetimeFigureOut">
               <a:rPr lang="en-CA" smtClean="0"/>
-              <a:t>2016-09-28</a:t>
+              <a:t>2016-09-30</a:t>
             </a:fld>
             <a:endParaRPr lang="en-CA"/>
           </a:p>
@@ -2572,7 +2572,7 @@
           <a:p>
             <a:fld id="{CF664A69-AE03-460E-A7AB-D964A2854FD9}" type="datetimeFigureOut">
               <a:rPr lang="en-CA" smtClean="0"/>
-              <a:t>2016-09-28</a:t>
+              <a:t>2016-09-30</a:t>
             </a:fld>
             <a:endParaRPr lang="en-CA"/>
           </a:p>
@@ -4476,6 +4476,77 @@
           </a:fontRef>
         </p:style>
       </p:cxnSp>
+      <p:sp>
+        <p:nvSpPr>
+          <p:cNvPr id="40" name="Oval 39"/>
+          <p:cNvSpPr/>
+          <p:nvPr/>
+        </p:nvSpPr>
+        <p:spPr>
+          <a:xfrm>
+            <a:off x="2645181" y="4661033"/>
+            <a:ext cx="2279561" cy="798490"/>
+          </a:xfrm>
+          <a:prstGeom prst="ellipse">
+            <a:avLst/>
+          </a:prstGeom>
+          <a:noFill/>
+        </p:spPr>
+        <p:style>
+          <a:lnRef idx="2">
+            <a:schemeClr val="dk1">
+              <a:shade val="50000"/>
+            </a:schemeClr>
+          </a:lnRef>
+          <a:fillRef idx="1">
+            <a:schemeClr val="dk1"/>
+          </a:fillRef>
+          <a:effectRef idx="0">
+            <a:schemeClr val="dk1"/>
+          </a:effectRef>
+          <a:fontRef idx="minor">
+            <a:schemeClr val="lt1"/>
+          </a:fontRef>
+        </p:style>
+        <p:txBody>
+          <a:bodyPr rtlCol="0" anchor="ctr"/>
+          <a:lstStyle/>
+          <a:p>
+            <a:pPr algn="ctr"/>
+            <a:endParaRPr lang="en-CA"/>
+          </a:p>
+        </p:txBody>
+      </p:sp>
+      <p:sp>
+        <p:nvSpPr>
+          <p:cNvPr id="41" name="TextBox 40"/>
+          <p:cNvSpPr txBox="1"/>
+          <p:nvPr/>
+        </p:nvSpPr>
+        <p:spPr>
+          <a:xfrm>
+            <a:off x="3087358" y="4892056"/>
+            <a:ext cx="1772992" cy="307777"/>
+          </a:xfrm>
+          <a:prstGeom prst="rect">
+            <a:avLst/>
+          </a:prstGeom>
+          <a:noFill/>
+        </p:spPr>
+        <p:txBody>
+          <a:bodyPr wrap="square" rtlCol="0">
+            <a:spAutoFit/>
+          </a:bodyPr>
+          <a:lstStyle/>
+          <a:p>
+            <a:r>
+              <a:rPr lang="en-CA" sz="1400" dirty="0" smtClean="0"/>
+              <a:t>Choose Board size</a:t>
+            </a:r>
+            <a:endParaRPr lang="en-CA" sz="1400" dirty="0"/>
+          </a:p>
+        </p:txBody>
+      </p:sp>
     </p:spTree>
     <p:extLst>
       <p:ext uri="{BB962C8B-B14F-4D97-AF65-F5344CB8AC3E}">
@@ -6967,7 +7038,7 @@
         </p:nvSpPr>
         <p:spPr>
           <a:xfrm>
-            <a:off x="1416677" y="4954211"/>
+            <a:off x="1427558" y="4954029"/>
             <a:ext cx="1068947" cy="386366"/>
           </a:xfrm>
           <a:prstGeom prst="roundRect">
@@ -7015,7 +7086,7 @@
         </p:nvSpPr>
         <p:spPr>
           <a:xfrm>
-            <a:off x="9146951" y="4971245"/>
+            <a:off x="9157832" y="4971063"/>
             <a:ext cx="1038554" cy="369332"/>
           </a:xfrm>
           <a:prstGeom prst="rect">
@@ -7045,7 +7116,7 @@
         </p:nvSpPr>
         <p:spPr>
           <a:xfrm>
-            <a:off x="1629535" y="4954211"/>
+            <a:off x="1640416" y="4954029"/>
             <a:ext cx="591829" cy="369332"/>
           </a:xfrm>
           <a:prstGeom prst="rect">
@@ -7867,7 +7938,7 @@
         </p:nvSpPr>
         <p:spPr>
           <a:xfrm>
-            <a:off x="2698482" y="4962934"/>
+            <a:off x="2709363" y="4962752"/>
             <a:ext cx="1068947" cy="386366"/>
           </a:xfrm>
           <a:prstGeom prst="roundRect">
@@ -7915,7 +7986,7 @@
         </p:nvSpPr>
         <p:spPr>
           <a:xfrm>
-            <a:off x="2866982" y="4954211"/>
+            <a:off x="2877863" y="4954029"/>
             <a:ext cx="622286" cy="369332"/>
           </a:xfrm>
           <a:prstGeom prst="rect">
@@ -8101,7 +8172,6 @@
               <a:rPr lang="en-CA" dirty="0"/>
               <a:t>7</a:t>
             </a:r>
-            <a:endParaRPr lang="en-CA" dirty="0"/>
           </a:p>
         </p:txBody>
       </p:sp>
@@ -8269,7 +8339,7 @@
         </p:nvSpPr>
         <p:spPr>
           <a:xfrm>
-            <a:off x="1120462" y="1326524"/>
+            <a:off x="1238781" y="1326524"/>
             <a:ext cx="9749307" cy="4262907"/>
           </a:xfrm>
           <a:prstGeom prst="rect">
@@ -8319,8 +8389,8 @@
         </p:nvSpPr>
         <p:spPr>
           <a:xfrm>
-            <a:off x="1279831" y="1584102"/>
-            <a:ext cx="1883066" cy="830997"/>
+            <a:off x="4821520" y="1545466"/>
+            <a:ext cx="2583831" cy="461665"/>
           </a:xfrm>
           <a:prstGeom prst="rect">
             <a:avLst/>
@@ -8335,7 +8405,7 @@
           <a:p>
             <a:r>
               <a:rPr lang="en-CA" sz="2400" dirty="0" smtClean="0"/>
-              <a:t>Game properties</a:t>
+              <a:t>Team Selection</a:t>
             </a:r>
             <a:endParaRPr lang="en-CA" sz="2400" dirty="0"/>
           </a:p>
@@ -8343,13 +8413,660 @@
       </p:sp>
       <p:sp>
         <p:nvSpPr>
-          <p:cNvPr id="7" name="Rounded Rectangle 6"/>
+          <p:cNvPr id="43" name="Rectangle 42"/>
           <p:cNvSpPr/>
           <p:nvPr/>
         </p:nvSpPr>
         <p:spPr>
           <a:xfrm>
-            <a:off x="9105363" y="4988486"/>
+            <a:off x="3160144" y="2226073"/>
+            <a:ext cx="5679583" cy="3136110"/>
+          </a:xfrm>
+          <a:prstGeom prst="rect">
+            <a:avLst/>
+          </a:prstGeom>
+          <a:solidFill>
+            <a:schemeClr val="bg2">
+              <a:lumMod val="90000"/>
+            </a:schemeClr>
+          </a:solidFill>
+          <a:ln>
+            <a:solidFill>
+              <a:schemeClr val="tx1"/>
+            </a:solidFill>
+          </a:ln>
+        </p:spPr>
+        <p:style>
+          <a:lnRef idx="2">
+            <a:schemeClr val="accent1">
+              <a:shade val="50000"/>
+            </a:schemeClr>
+          </a:lnRef>
+          <a:fillRef idx="1">
+            <a:schemeClr val="accent1"/>
+          </a:fillRef>
+          <a:effectRef idx="0">
+            <a:schemeClr val="accent1"/>
+          </a:effectRef>
+          <a:fontRef idx="minor">
+            <a:schemeClr val="lt1"/>
+          </a:fontRef>
+        </p:style>
+        <p:txBody>
+          <a:bodyPr rtlCol="0" anchor="ctr"/>
+          <a:lstStyle/>
+          <a:p>
+            <a:pPr algn="ctr"/>
+            <a:endParaRPr lang="en-CA"/>
+          </a:p>
+        </p:txBody>
+      </p:sp>
+      <p:sp>
+        <p:nvSpPr>
+          <p:cNvPr id="44" name="Rectangle 43"/>
+          <p:cNvSpPr/>
+          <p:nvPr/>
+        </p:nvSpPr>
+        <p:spPr>
+          <a:xfrm>
+            <a:off x="3160144" y="2226072"/>
+            <a:ext cx="283336" cy="3136110"/>
+          </a:xfrm>
+          <a:prstGeom prst="rect">
+            <a:avLst/>
+          </a:prstGeom>
+          <a:solidFill>
+            <a:schemeClr val="bg1">
+              <a:lumMod val="95000"/>
+            </a:schemeClr>
+          </a:solidFill>
+          <a:ln>
+            <a:solidFill>
+              <a:schemeClr val="tx1"/>
+            </a:solidFill>
+          </a:ln>
+        </p:spPr>
+        <p:style>
+          <a:lnRef idx="2">
+            <a:schemeClr val="accent1">
+              <a:shade val="50000"/>
+            </a:schemeClr>
+          </a:lnRef>
+          <a:fillRef idx="1">
+            <a:schemeClr val="accent1"/>
+          </a:fillRef>
+          <a:effectRef idx="0">
+            <a:schemeClr val="accent1"/>
+          </a:effectRef>
+          <a:fontRef idx="minor">
+            <a:schemeClr val="lt1"/>
+          </a:fontRef>
+        </p:style>
+        <p:txBody>
+          <a:bodyPr rtlCol="0" anchor="ctr"/>
+          <a:lstStyle/>
+          <a:p>
+            <a:pPr algn="ctr"/>
+            <a:endParaRPr lang="en-CA"/>
+          </a:p>
+        </p:txBody>
+      </p:sp>
+      <p:sp>
+        <p:nvSpPr>
+          <p:cNvPr id="49" name="Rectangle 48"/>
+          <p:cNvSpPr/>
+          <p:nvPr/>
+        </p:nvSpPr>
+        <p:spPr>
+          <a:xfrm>
+            <a:off x="3173023" y="2226071"/>
+            <a:ext cx="270457" cy="269479"/>
+          </a:xfrm>
+          <a:prstGeom prst="rect">
+            <a:avLst/>
+          </a:prstGeom>
+          <a:solidFill>
+            <a:schemeClr val="bg1"/>
+          </a:solidFill>
+        </p:spPr>
+        <p:style>
+          <a:lnRef idx="2">
+            <a:schemeClr val="accent1">
+              <a:shade val="50000"/>
+            </a:schemeClr>
+          </a:lnRef>
+          <a:fillRef idx="1">
+            <a:schemeClr val="accent1"/>
+          </a:fillRef>
+          <a:effectRef idx="0">
+            <a:schemeClr val="accent1"/>
+          </a:effectRef>
+          <a:fontRef idx="minor">
+            <a:schemeClr val="lt1"/>
+          </a:fontRef>
+        </p:style>
+        <p:txBody>
+          <a:bodyPr rtlCol="0" anchor="ctr"/>
+          <a:lstStyle/>
+          <a:p>
+            <a:pPr algn="ctr"/>
+            <a:endParaRPr lang="en-CA"/>
+          </a:p>
+        </p:txBody>
+      </p:sp>
+      <p:sp>
+        <p:nvSpPr>
+          <p:cNvPr id="45" name="Up Arrow 44"/>
+          <p:cNvSpPr/>
+          <p:nvPr/>
+        </p:nvSpPr>
+        <p:spPr>
+          <a:xfrm>
+            <a:off x="3230978" y="2271182"/>
+            <a:ext cx="141668" cy="139557"/>
+          </a:xfrm>
+          <a:prstGeom prst="upArrow">
+            <a:avLst/>
+          </a:prstGeom>
+          <a:solidFill>
+            <a:schemeClr val="tx1"/>
+          </a:solidFill>
+          <a:ln>
+            <a:solidFill>
+              <a:schemeClr val="tx1"/>
+            </a:solidFill>
+          </a:ln>
+        </p:spPr>
+        <p:style>
+          <a:lnRef idx="2">
+            <a:schemeClr val="accent1">
+              <a:shade val="50000"/>
+            </a:schemeClr>
+          </a:lnRef>
+          <a:fillRef idx="1">
+            <a:schemeClr val="accent1"/>
+          </a:fillRef>
+          <a:effectRef idx="0">
+            <a:schemeClr val="accent1"/>
+          </a:effectRef>
+          <a:fontRef idx="minor">
+            <a:schemeClr val="lt1"/>
+          </a:fontRef>
+        </p:style>
+        <p:txBody>
+          <a:bodyPr rtlCol="0" anchor="ctr"/>
+          <a:lstStyle/>
+          <a:p>
+            <a:pPr algn="ctr"/>
+            <a:endParaRPr lang="en-CA"/>
+          </a:p>
+        </p:txBody>
+      </p:sp>
+      <p:sp>
+        <p:nvSpPr>
+          <p:cNvPr id="55" name="Rectangle 54"/>
+          <p:cNvSpPr/>
+          <p:nvPr/>
+        </p:nvSpPr>
+        <p:spPr>
+          <a:xfrm>
+            <a:off x="3158928" y="5092703"/>
+            <a:ext cx="270457" cy="269479"/>
+          </a:xfrm>
+          <a:prstGeom prst="rect">
+            <a:avLst/>
+          </a:prstGeom>
+          <a:solidFill>
+            <a:schemeClr val="bg1"/>
+          </a:solidFill>
+        </p:spPr>
+        <p:style>
+          <a:lnRef idx="2">
+            <a:schemeClr val="accent1">
+              <a:shade val="50000"/>
+            </a:schemeClr>
+          </a:lnRef>
+          <a:fillRef idx="1">
+            <a:schemeClr val="accent1"/>
+          </a:fillRef>
+          <a:effectRef idx="0">
+            <a:schemeClr val="accent1"/>
+          </a:effectRef>
+          <a:fontRef idx="minor">
+            <a:schemeClr val="lt1"/>
+          </a:fontRef>
+        </p:style>
+        <p:txBody>
+          <a:bodyPr rtlCol="0" anchor="ctr"/>
+          <a:lstStyle/>
+          <a:p>
+            <a:pPr algn="ctr"/>
+            <a:endParaRPr lang="en-CA"/>
+          </a:p>
+        </p:txBody>
+      </p:sp>
+      <p:sp>
+        <p:nvSpPr>
+          <p:cNvPr id="46" name="Up Arrow 45"/>
+          <p:cNvSpPr/>
+          <p:nvPr/>
+        </p:nvSpPr>
+        <p:spPr>
+          <a:xfrm flipV="1">
+            <a:off x="3208903" y="5199117"/>
+            <a:ext cx="185818" cy="163065"/>
+          </a:xfrm>
+          <a:prstGeom prst="upArrow">
+            <a:avLst/>
+          </a:prstGeom>
+          <a:solidFill>
+            <a:schemeClr val="tx1"/>
+          </a:solidFill>
+          <a:ln>
+            <a:solidFill>
+              <a:schemeClr val="tx1"/>
+            </a:solidFill>
+          </a:ln>
+        </p:spPr>
+        <p:style>
+          <a:lnRef idx="2">
+            <a:schemeClr val="accent1">
+              <a:shade val="50000"/>
+            </a:schemeClr>
+          </a:lnRef>
+          <a:fillRef idx="1">
+            <a:schemeClr val="accent1"/>
+          </a:fillRef>
+          <a:effectRef idx="0">
+            <a:schemeClr val="accent1"/>
+          </a:effectRef>
+          <a:fontRef idx="minor">
+            <a:schemeClr val="lt1"/>
+          </a:fontRef>
+        </p:style>
+        <p:txBody>
+          <a:bodyPr rtlCol="0" anchor="ctr"/>
+          <a:lstStyle/>
+          <a:p>
+            <a:pPr algn="ctr"/>
+            <a:endParaRPr lang="en-CA"/>
+          </a:p>
+        </p:txBody>
+      </p:sp>
+      <p:sp>
+        <p:nvSpPr>
+          <p:cNvPr id="47" name="TextBox 46"/>
+          <p:cNvSpPr txBox="1"/>
+          <p:nvPr/>
+        </p:nvSpPr>
+        <p:spPr>
+          <a:xfrm>
+            <a:off x="4171259" y="2222861"/>
+            <a:ext cx="5125792" cy="3139321"/>
+          </a:xfrm>
+          <a:prstGeom prst="rect">
+            <a:avLst/>
+          </a:prstGeom>
+          <a:noFill/>
+        </p:spPr>
+        <p:txBody>
+          <a:bodyPr wrap="square" rtlCol="0">
+            <a:spAutoFit/>
+          </a:bodyPr>
+          <a:lstStyle/>
+          <a:p>
+            <a:r>
+              <a:rPr lang="en-CA" dirty="0" smtClean="0"/>
+              <a:t>Team 1</a:t>
+            </a:r>
+          </a:p>
+          <a:p>
+            <a:endParaRPr lang="en-CA" dirty="0" smtClean="0"/>
+          </a:p>
+          <a:p>
+            <a:r>
+              <a:rPr lang="en-CA" dirty="0" smtClean="0"/>
+              <a:t>Team 2</a:t>
+            </a:r>
+          </a:p>
+          <a:p>
+            <a:endParaRPr lang="en-CA" dirty="0" smtClean="0"/>
+          </a:p>
+          <a:p>
+            <a:r>
+              <a:rPr lang="en-CA" dirty="0" smtClean="0"/>
+              <a:t>Team 3</a:t>
+            </a:r>
+          </a:p>
+          <a:p>
+            <a:r>
+              <a:rPr lang="en-CA" dirty="0" smtClean="0"/>
+              <a:t> </a:t>
+            </a:r>
+          </a:p>
+          <a:p>
+            <a:r>
+              <a:rPr lang="en-CA" dirty="0" smtClean="0"/>
+              <a:t>Team 4</a:t>
+            </a:r>
+          </a:p>
+          <a:p>
+            <a:endParaRPr lang="en-CA" dirty="0" smtClean="0"/>
+          </a:p>
+          <a:p>
+            <a:r>
+              <a:rPr lang="en-CA" dirty="0" smtClean="0"/>
+              <a:t>Team 5</a:t>
+            </a:r>
+          </a:p>
+          <a:p>
+            <a:endParaRPr lang="en-CA" dirty="0" smtClean="0"/>
+          </a:p>
+          <a:p>
+            <a:r>
+              <a:rPr lang="en-CA" dirty="0" smtClean="0"/>
+              <a:t>Team 6</a:t>
+            </a:r>
+          </a:p>
+        </p:txBody>
+      </p:sp>
+      <p:sp>
+        <p:nvSpPr>
+          <p:cNvPr id="8" name="Rectangle 7"/>
+          <p:cNvSpPr/>
+          <p:nvPr/>
+        </p:nvSpPr>
+        <p:spPr>
+          <a:xfrm>
+            <a:off x="3626394" y="2271182"/>
+            <a:ext cx="361950" cy="361950"/>
+          </a:xfrm>
+          <a:prstGeom prst="rect">
+            <a:avLst/>
+          </a:prstGeom>
+          <a:solidFill>
+            <a:schemeClr val="bg2"/>
+          </a:solidFill>
+          <a:ln w="19050">
+            <a:solidFill>
+              <a:schemeClr val="tx1"/>
+            </a:solidFill>
+          </a:ln>
+        </p:spPr>
+        <p:style>
+          <a:lnRef idx="2">
+            <a:schemeClr val="accent1">
+              <a:shade val="50000"/>
+            </a:schemeClr>
+          </a:lnRef>
+          <a:fillRef idx="1">
+            <a:schemeClr val="accent1"/>
+          </a:fillRef>
+          <a:effectRef idx="0">
+            <a:schemeClr val="accent1"/>
+          </a:effectRef>
+          <a:fontRef idx="minor">
+            <a:schemeClr val="lt1"/>
+          </a:fontRef>
+        </p:style>
+        <p:txBody>
+          <a:bodyPr rtlCol="0" anchor="ctr"/>
+          <a:lstStyle/>
+          <a:p>
+            <a:pPr algn="ctr"/>
+            <a:endParaRPr lang="en-CA"/>
+          </a:p>
+        </p:txBody>
+      </p:sp>
+      <p:sp>
+        <p:nvSpPr>
+          <p:cNvPr id="56" name="Rectangle 55"/>
+          <p:cNvSpPr/>
+          <p:nvPr/>
+        </p:nvSpPr>
+        <p:spPr>
+          <a:xfrm>
+            <a:off x="3623763" y="2799972"/>
+            <a:ext cx="361950" cy="361950"/>
+          </a:xfrm>
+          <a:prstGeom prst="rect">
+            <a:avLst/>
+          </a:prstGeom>
+          <a:solidFill>
+            <a:schemeClr val="bg2"/>
+          </a:solidFill>
+          <a:ln w="19050">
+            <a:solidFill>
+              <a:schemeClr val="tx1"/>
+            </a:solidFill>
+          </a:ln>
+        </p:spPr>
+        <p:style>
+          <a:lnRef idx="2">
+            <a:schemeClr val="accent1">
+              <a:shade val="50000"/>
+            </a:schemeClr>
+          </a:lnRef>
+          <a:fillRef idx="1">
+            <a:schemeClr val="accent1"/>
+          </a:fillRef>
+          <a:effectRef idx="0">
+            <a:schemeClr val="accent1"/>
+          </a:effectRef>
+          <a:fontRef idx="minor">
+            <a:schemeClr val="lt1"/>
+          </a:fontRef>
+        </p:style>
+        <p:txBody>
+          <a:bodyPr rtlCol="0" anchor="ctr"/>
+          <a:lstStyle/>
+          <a:p>
+            <a:pPr algn="ctr"/>
+            <a:endParaRPr lang="en-CA"/>
+          </a:p>
+        </p:txBody>
+      </p:sp>
+      <p:sp>
+        <p:nvSpPr>
+          <p:cNvPr id="57" name="Rectangle 56"/>
+          <p:cNvSpPr/>
+          <p:nvPr/>
+        </p:nvSpPr>
+        <p:spPr>
+          <a:xfrm>
+            <a:off x="3629026" y="4876228"/>
+            <a:ext cx="361950" cy="361950"/>
+          </a:xfrm>
+          <a:prstGeom prst="rect">
+            <a:avLst/>
+          </a:prstGeom>
+          <a:solidFill>
+            <a:schemeClr val="bg2"/>
+          </a:solidFill>
+          <a:ln w="19050">
+            <a:solidFill>
+              <a:schemeClr val="tx1"/>
+            </a:solidFill>
+          </a:ln>
+        </p:spPr>
+        <p:style>
+          <a:lnRef idx="2">
+            <a:schemeClr val="accent1">
+              <a:shade val="50000"/>
+            </a:schemeClr>
+          </a:lnRef>
+          <a:fillRef idx="1">
+            <a:schemeClr val="accent1"/>
+          </a:fillRef>
+          <a:effectRef idx="0">
+            <a:schemeClr val="accent1"/>
+          </a:effectRef>
+          <a:fontRef idx="minor">
+            <a:schemeClr val="lt1"/>
+          </a:fontRef>
+        </p:style>
+        <p:txBody>
+          <a:bodyPr rtlCol="0" anchor="ctr"/>
+          <a:lstStyle/>
+          <a:p>
+            <a:pPr algn="ctr"/>
+            <a:endParaRPr lang="en-CA"/>
+          </a:p>
+        </p:txBody>
+      </p:sp>
+      <p:sp>
+        <p:nvSpPr>
+          <p:cNvPr id="58" name="Rectangle 57"/>
+          <p:cNvSpPr/>
+          <p:nvPr/>
+        </p:nvSpPr>
+        <p:spPr>
+          <a:xfrm>
+            <a:off x="3626394" y="4390274"/>
+            <a:ext cx="361950" cy="361950"/>
+          </a:xfrm>
+          <a:prstGeom prst="rect">
+            <a:avLst/>
+          </a:prstGeom>
+          <a:solidFill>
+            <a:schemeClr val="bg2"/>
+          </a:solidFill>
+          <a:ln w="19050">
+            <a:solidFill>
+              <a:schemeClr val="tx1"/>
+            </a:solidFill>
+          </a:ln>
+        </p:spPr>
+        <p:style>
+          <a:lnRef idx="2">
+            <a:schemeClr val="accent1">
+              <a:shade val="50000"/>
+            </a:schemeClr>
+          </a:lnRef>
+          <a:fillRef idx="1">
+            <a:schemeClr val="accent1"/>
+          </a:fillRef>
+          <a:effectRef idx="0">
+            <a:schemeClr val="accent1"/>
+          </a:effectRef>
+          <a:fontRef idx="minor">
+            <a:schemeClr val="lt1"/>
+          </a:fontRef>
+        </p:style>
+        <p:txBody>
+          <a:bodyPr rtlCol="0" anchor="ctr"/>
+          <a:lstStyle/>
+          <a:p>
+            <a:pPr algn="ctr"/>
+            <a:endParaRPr lang="en-CA"/>
+          </a:p>
+        </p:txBody>
+      </p:sp>
+      <p:sp>
+        <p:nvSpPr>
+          <p:cNvPr id="59" name="Rectangle 58"/>
+          <p:cNvSpPr/>
+          <p:nvPr/>
+        </p:nvSpPr>
+        <p:spPr>
+          <a:xfrm>
+            <a:off x="3623763" y="3328762"/>
+            <a:ext cx="361950" cy="361950"/>
+          </a:xfrm>
+          <a:prstGeom prst="rect">
+            <a:avLst/>
+          </a:prstGeom>
+          <a:solidFill>
+            <a:schemeClr val="bg2"/>
+          </a:solidFill>
+          <a:ln w="19050">
+            <a:solidFill>
+              <a:schemeClr val="tx1"/>
+            </a:solidFill>
+          </a:ln>
+        </p:spPr>
+        <p:style>
+          <a:lnRef idx="2">
+            <a:schemeClr val="accent1">
+              <a:shade val="50000"/>
+            </a:schemeClr>
+          </a:lnRef>
+          <a:fillRef idx="1">
+            <a:schemeClr val="accent1"/>
+          </a:fillRef>
+          <a:effectRef idx="0">
+            <a:schemeClr val="accent1"/>
+          </a:effectRef>
+          <a:fontRef idx="minor">
+            <a:schemeClr val="lt1"/>
+          </a:fontRef>
+        </p:style>
+        <p:txBody>
+          <a:bodyPr rtlCol="0" anchor="ctr"/>
+          <a:lstStyle/>
+          <a:p>
+            <a:pPr algn="ctr"/>
+            <a:endParaRPr lang="en-CA"/>
+          </a:p>
+        </p:txBody>
+      </p:sp>
+      <p:sp>
+        <p:nvSpPr>
+          <p:cNvPr id="60" name="Rectangle 59"/>
+          <p:cNvSpPr/>
+          <p:nvPr/>
+        </p:nvSpPr>
+        <p:spPr>
+          <a:xfrm>
+            <a:off x="3617847" y="3857552"/>
+            <a:ext cx="361950" cy="361950"/>
+          </a:xfrm>
+          <a:prstGeom prst="rect">
+            <a:avLst/>
+          </a:prstGeom>
+          <a:solidFill>
+            <a:schemeClr val="bg2"/>
+          </a:solidFill>
+          <a:ln w="19050">
+            <a:solidFill>
+              <a:schemeClr val="tx1"/>
+            </a:solidFill>
+          </a:ln>
+        </p:spPr>
+        <p:style>
+          <a:lnRef idx="2">
+            <a:schemeClr val="accent1">
+              <a:shade val="50000"/>
+            </a:schemeClr>
+          </a:lnRef>
+          <a:fillRef idx="1">
+            <a:schemeClr val="accent1"/>
+          </a:fillRef>
+          <a:effectRef idx="0">
+            <a:schemeClr val="accent1"/>
+          </a:effectRef>
+          <a:fontRef idx="minor">
+            <a:schemeClr val="lt1"/>
+          </a:fontRef>
+        </p:style>
+        <p:txBody>
+          <a:bodyPr rtlCol="0" anchor="ctr"/>
+          <a:lstStyle/>
+          <a:p>
+            <a:pPr algn="ctr"/>
+            <a:endParaRPr lang="en-CA"/>
+          </a:p>
+        </p:txBody>
+      </p:sp>
+      <p:sp>
+        <p:nvSpPr>
+          <p:cNvPr id="61" name="Rounded Rectangle 60"/>
+          <p:cNvSpPr/>
+          <p:nvPr/>
+        </p:nvSpPr>
+        <p:spPr>
+          <a:xfrm>
+            <a:off x="1578442" y="4943799"/>
             <a:ext cx="1068947" cy="386366"/>
           </a:xfrm>
           <a:prstGeom prst="roundRect">
@@ -8391,13 +9108,43 @@
       </p:sp>
       <p:sp>
         <p:nvSpPr>
-          <p:cNvPr id="9" name="Rounded Rectangle 8"/>
+          <p:cNvPr id="62" name="TextBox 61"/>
+          <p:cNvSpPr txBox="1"/>
+          <p:nvPr/>
+        </p:nvSpPr>
+        <p:spPr>
+          <a:xfrm>
+            <a:off x="1791300" y="4943799"/>
+            <a:ext cx="591829" cy="369332"/>
+          </a:xfrm>
+          <a:prstGeom prst="rect">
+            <a:avLst/>
+          </a:prstGeom>
+          <a:noFill/>
+        </p:spPr>
+        <p:txBody>
+          <a:bodyPr wrap="none" rtlCol="0">
+            <a:spAutoFit/>
+          </a:bodyPr>
+          <a:lstStyle/>
+          <a:p>
+            <a:r>
+              <a:rPr lang="en-CA" dirty="0" smtClean="0"/>
+              <a:t>Quit</a:t>
+            </a:r>
+            <a:endParaRPr lang="en-CA" dirty="0"/>
+          </a:p>
+        </p:txBody>
+      </p:sp>
+      <p:sp>
+        <p:nvSpPr>
+          <p:cNvPr id="63" name="Rounded Rectangle 62"/>
           <p:cNvSpPr/>
           <p:nvPr/>
         </p:nvSpPr>
         <p:spPr>
           <a:xfrm>
-            <a:off x="1416677" y="4954211"/>
+            <a:off x="1585639" y="4298167"/>
             <a:ext cx="1068947" cy="386366"/>
           </a:xfrm>
           <a:prstGeom prst="roundRect">
@@ -8439,14 +9186,14 @@
       </p:sp>
       <p:sp>
         <p:nvSpPr>
-          <p:cNvPr id="10" name="TextBox 9"/>
+          <p:cNvPr id="64" name="TextBox 63"/>
           <p:cNvSpPr txBox="1"/>
           <p:nvPr/>
         </p:nvSpPr>
         <p:spPr>
           <a:xfrm>
-            <a:off x="9146951" y="4971245"/>
-            <a:ext cx="1038554" cy="369332"/>
+            <a:off x="1754139" y="4289444"/>
+            <a:ext cx="622286" cy="369332"/>
           </a:xfrm>
           <a:prstGeom prst="rect">
             <a:avLst/>
@@ -8461,7 +9208,7 @@
           <a:p>
             <a:r>
               <a:rPr lang="en-CA" dirty="0" smtClean="0"/>
-              <a:t>Continue</a:t>
+              <a:t>Back</a:t>
             </a:r>
             <a:endParaRPr lang="en-CA" dirty="0"/>
           </a:p>
@@ -8469,166 +9216,16 @@
       </p:sp>
       <p:sp>
         <p:nvSpPr>
-          <p:cNvPr id="13" name="TextBox 12"/>
-          <p:cNvSpPr txBox="1"/>
-          <p:nvPr/>
-        </p:nvSpPr>
-        <p:spPr>
-          <a:xfrm>
-            <a:off x="1629535" y="4954211"/>
-            <a:ext cx="591829" cy="369332"/>
-          </a:xfrm>
-          <a:prstGeom prst="rect">
-            <a:avLst/>
-          </a:prstGeom>
-          <a:noFill/>
-        </p:spPr>
-        <p:txBody>
-          <a:bodyPr wrap="none" rtlCol="0">
-            <a:spAutoFit/>
-          </a:bodyPr>
-          <a:lstStyle/>
-          <a:p>
-            <a:r>
-              <a:rPr lang="en-CA" dirty="0" smtClean="0"/>
-              <a:t>Quit</a:t>
-            </a:r>
-            <a:endParaRPr lang="en-CA" dirty="0"/>
-          </a:p>
-        </p:txBody>
-      </p:sp>
-      <p:sp>
-        <p:nvSpPr>
-          <p:cNvPr id="2" name="TextBox 1"/>
-          <p:cNvSpPr txBox="1"/>
-          <p:nvPr/>
-        </p:nvSpPr>
-        <p:spPr>
-          <a:xfrm>
-            <a:off x="1279831" y="2766880"/>
-            <a:ext cx="2118217" cy="646331"/>
-          </a:xfrm>
-          <a:prstGeom prst="rect">
-            <a:avLst/>
-          </a:prstGeom>
-          <a:noFill/>
-        </p:spPr>
-        <p:txBody>
-          <a:bodyPr wrap="square" rtlCol="0">
-            <a:spAutoFit/>
-          </a:bodyPr>
-          <a:lstStyle/>
-          <a:p>
-            <a:r>
-              <a:rPr lang="en-CA" dirty="0" smtClean="0"/>
-              <a:t>How many colors will be playing?</a:t>
-            </a:r>
-            <a:endParaRPr lang="en-CA" dirty="0"/>
-          </a:p>
-        </p:txBody>
-      </p:sp>
-      <p:sp>
-        <p:nvSpPr>
-          <p:cNvPr id="3" name="TextBox 2"/>
-          <p:cNvSpPr txBox="1"/>
-          <p:nvPr/>
-        </p:nvSpPr>
-        <p:spPr>
-          <a:xfrm>
-            <a:off x="3557417" y="2859110"/>
-            <a:ext cx="373487" cy="369332"/>
-          </a:xfrm>
-          <a:prstGeom prst="rect">
-            <a:avLst/>
-          </a:prstGeom>
-          <a:noFill/>
-        </p:spPr>
-        <p:txBody>
-          <a:bodyPr wrap="square" rtlCol="0">
-            <a:spAutoFit/>
-          </a:bodyPr>
-          <a:lstStyle/>
-          <a:p>
-            <a:r>
-              <a:rPr lang="en-CA" dirty="0" smtClean="0"/>
-              <a:t>2</a:t>
-            </a:r>
-            <a:endParaRPr lang="en-CA" dirty="0"/>
-          </a:p>
-        </p:txBody>
-      </p:sp>
-      <p:sp>
-        <p:nvSpPr>
-          <p:cNvPr id="14" name="TextBox 13"/>
-          <p:cNvSpPr txBox="1"/>
-          <p:nvPr/>
-        </p:nvSpPr>
-        <p:spPr>
-          <a:xfrm>
-            <a:off x="3557417" y="3387453"/>
-            <a:ext cx="373487" cy="369332"/>
-          </a:xfrm>
-          <a:prstGeom prst="rect">
-            <a:avLst/>
-          </a:prstGeom>
-          <a:noFill/>
-        </p:spPr>
-        <p:txBody>
-          <a:bodyPr wrap="square" rtlCol="0">
-            <a:spAutoFit/>
-          </a:bodyPr>
-          <a:lstStyle/>
-          <a:p>
-            <a:r>
-              <a:rPr lang="en-CA" dirty="0" smtClean="0"/>
-              <a:t>3</a:t>
-            </a:r>
-            <a:endParaRPr lang="en-CA" dirty="0"/>
-          </a:p>
-        </p:txBody>
-      </p:sp>
-      <p:sp>
-        <p:nvSpPr>
-          <p:cNvPr id="15" name="TextBox 14"/>
-          <p:cNvSpPr txBox="1"/>
-          <p:nvPr/>
-        </p:nvSpPr>
-        <p:spPr>
-          <a:xfrm>
-            <a:off x="3557417" y="3977340"/>
-            <a:ext cx="373487" cy="369332"/>
-          </a:xfrm>
-          <a:prstGeom prst="rect">
-            <a:avLst/>
-          </a:prstGeom>
-          <a:noFill/>
-        </p:spPr>
-        <p:txBody>
-          <a:bodyPr wrap="square" rtlCol="0">
-            <a:spAutoFit/>
-          </a:bodyPr>
-          <a:lstStyle/>
-          <a:p>
-            <a:r>
-              <a:rPr lang="en-CA" dirty="0" smtClean="0"/>
-              <a:t>6</a:t>
-            </a:r>
-            <a:endParaRPr lang="en-CA" dirty="0"/>
-          </a:p>
-        </p:txBody>
-      </p:sp>
-      <p:sp>
-        <p:nvSpPr>
-          <p:cNvPr id="11" name="Flowchart: Connector 10"/>
+          <p:cNvPr id="65" name="Rounded Rectangle 64"/>
           <p:cNvSpPr/>
           <p:nvPr/>
         </p:nvSpPr>
         <p:spPr>
           <a:xfrm>
-            <a:off x="4090273" y="2859110"/>
-            <a:ext cx="257577" cy="227665"/>
-          </a:xfrm>
-          <a:prstGeom prst="flowChartConnector">
+            <a:off x="9389586" y="4926765"/>
+            <a:ext cx="1068947" cy="386366"/>
+          </a:xfrm>
+          <a:prstGeom prst="roundRect">
             <a:avLst/>
           </a:prstGeom>
           <a:solidFill>
@@ -8667,686 +9264,14 @@
       </p:sp>
       <p:sp>
         <p:nvSpPr>
-          <p:cNvPr id="16" name="Flowchart: Connector 15"/>
-          <p:cNvSpPr/>
-          <p:nvPr/>
-        </p:nvSpPr>
-        <p:spPr>
-          <a:xfrm>
-            <a:off x="4085064" y="3462339"/>
-            <a:ext cx="257577" cy="227665"/>
-          </a:xfrm>
-          <a:prstGeom prst="flowChartConnector">
-            <a:avLst/>
-          </a:prstGeom>
-          <a:solidFill>
-            <a:schemeClr val="bg1"/>
-          </a:solidFill>
-          <a:ln>
-            <a:solidFill>
-              <a:schemeClr val="tx1"/>
-            </a:solidFill>
-          </a:ln>
-        </p:spPr>
-        <p:style>
-          <a:lnRef idx="2">
-            <a:schemeClr val="accent1">
-              <a:shade val="50000"/>
-            </a:schemeClr>
-          </a:lnRef>
-          <a:fillRef idx="1">
-            <a:schemeClr val="accent1"/>
-          </a:fillRef>
-          <a:effectRef idx="0">
-            <a:schemeClr val="accent1"/>
-          </a:effectRef>
-          <a:fontRef idx="minor">
-            <a:schemeClr val="lt1"/>
-          </a:fontRef>
-        </p:style>
-        <p:txBody>
-          <a:bodyPr rtlCol="0" anchor="ctr"/>
-          <a:lstStyle/>
-          <a:p>
-            <a:pPr algn="ctr"/>
-            <a:endParaRPr lang="en-CA"/>
-          </a:p>
-        </p:txBody>
-      </p:sp>
-      <p:sp>
-        <p:nvSpPr>
-          <p:cNvPr id="17" name="Flowchart: Connector 16"/>
-          <p:cNvSpPr/>
-          <p:nvPr/>
-        </p:nvSpPr>
-        <p:spPr>
-          <a:xfrm>
-            <a:off x="4085064" y="4065568"/>
-            <a:ext cx="257577" cy="227665"/>
-          </a:xfrm>
-          <a:prstGeom prst="flowChartConnector">
-            <a:avLst/>
-          </a:prstGeom>
-          <a:solidFill>
-            <a:schemeClr val="bg1"/>
-          </a:solidFill>
-          <a:ln>
-            <a:solidFill>
-              <a:schemeClr val="tx1"/>
-            </a:solidFill>
-          </a:ln>
-        </p:spPr>
-        <p:style>
-          <a:lnRef idx="2">
-            <a:schemeClr val="accent1">
-              <a:shade val="50000"/>
-            </a:schemeClr>
-          </a:lnRef>
-          <a:fillRef idx="1">
-            <a:schemeClr val="accent1"/>
-          </a:fillRef>
-          <a:effectRef idx="0">
-            <a:schemeClr val="accent1"/>
-          </a:effectRef>
-          <a:fontRef idx="minor">
-            <a:schemeClr val="lt1"/>
-          </a:fontRef>
-        </p:style>
-        <p:txBody>
-          <a:bodyPr rtlCol="0" anchor="ctr"/>
-          <a:lstStyle/>
-          <a:p>
-            <a:pPr algn="ctr"/>
-            <a:endParaRPr lang="en-CA"/>
-          </a:p>
-        </p:txBody>
-      </p:sp>
-      <p:cxnSp>
-        <p:nvCxnSpPr>
-          <p:cNvPr id="19" name="Straight Connector 18"/>
-          <p:cNvCxnSpPr/>
-          <p:nvPr/>
-        </p:nvCxnSpPr>
-        <p:spPr>
-          <a:xfrm flipV="1">
-            <a:off x="5035639" y="1999600"/>
-            <a:ext cx="12879" cy="2688310"/>
-          </a:xfrm>
-          <a:prstGeom prst="line">
-            <a:avLst/>
-          </a:prstGeom>
-        </p:spPr>
-        <p:style>
-          <a:lnRef idx="1">
-            <a:schemeClr val="dk1"/>
-          </a:lnRef>
-          <a:fillRef idx="0">
-            <a:schemeClr val="dk1"/>
-          </a:fillRef>
-          <a:effectRef idx="0">
-            <a:schemeClr val="dk1"/>
-          </a:effectRef>
-          <a:fontRef idx="minor">
-            <a:schemeClr val="tx1"/>
-          </a:fontRef>
-        </p:style>
-      </p:cxnSp>
-      <p:sp>
-        <p:nvSpPr>
-          <p:cNvPr id="20" name="TextBox 19"/>
+          <p:cNvPr id="66" name="TextBox 65"/>
           <p:cNvSpPr txBox="1"/>
           <p:nvPr/>
         </p:nvSpPr>
         <p:spPr>
           <a:xfrm>
-            <a:off x="5245945" y="1584102"/>
-            <a:ext cx="2118217" cy="646331"/>
-          </a:xfrm>
-          <a:prstGeom prst="rect">
-            <a:avLst/>
-          </a:prstGeom>
-          <a:noFill/>
-        </p:spPr>
-        <p:txBody>
-          <a:bodyPr wrap="square" rtlCol="0">
-            <a:spAutoFit/>
-          </a:bodyPr>
-          <a:lstStyle/>
-          <a:p>
-            <a:r>
-              <a:rPr lang="en-CA" dirty="0" smtClean="0"/>
-              <a:t>How many humans will be playing?</a:t>
-            </a:r>
-            <a:endParaRPr lang="en-CA" dirty="0"/>
-          </a:p>
-        </p:txBody>
-      </p:sp>
-      <p:sp>
-        <p:nvSpPr>
-          <p:cNvPr id="21" name="TextBox 20"/>
-          <p:cNvSpPr txBox="1"/>
-          <p:nvPr/>
-        </p:nvSpPr>
-        <p:spPr>
-          <a:xfrm>
-            <a:off x="6704587" y="3107337"/>
-            <a:ext cx="373487" cy="369332"/>
-          </a:xfrm>
-          <a:prstGeom prst="rect">
-            <a:avLst/>
-          </a:prstGeom>
-          <a:noFill/>
-        </p:spPr>
-        <p:txBody>
-          <a:bodyPr wrap="square" rtlCol="0">
-            <a:spAutoFit/>
-          </a:bodyPr>
-          <a:lstStyle/>
-          <a:p>
-            <a:r>
-              <a:rPr lang="en-CA" dirty="0" smtClean="0"/>
-              <a:t>2</a:t>
-            </a:r>
-            <a:endParaRPr lang="en-CA" dirty="0"/>
-          </a:p>
-        </p:txBody>
-      </p:sp>
-      <p:sp>
-        <p:nvSpPr>
-          <p:cNvPr id="22" name="TextBox 21"/>
-          <p:cNvSpPr txBox="1"/>
-          <p:nvPr/>
-        </p:nvSpPr>
-        <p:spPr>
-          <a:xfrm>
-            <a:off x="6704587" y="3635680"/>
-            <a:ext cx="373487" cy="369332"/>
-          </a:xfrm>
-          <a:prstGeom prst="rect">
-            <a:avLst/>
-          </a:prstGeom>
-          <a:noFill/>
-        </p:spPr>
-        <p:txBody>
-          <a:bodyPr wrap="square" rtlCol="0">
-            <a:spAutoFit/>
-          </a:bodyPr>
-          <a:lstStyle/>
-          <a:p>
-            <a:r>
-              <a:rPr lang="en-CA" dirty="0" smtClean="0"/>
-              <a:t>4</a:t>
-            </a:r>
-            <a:endParaRPr lang="en-CA" dirty="0"/>
-          </a:p>
-        </p:txBody>
-      </p:sp>
-      <p:sp>
-        <p:nvSpPr>
-          <p:cNvPr id="23" name="TextBox 22"/>
-          <p:cNvSpPr txBox="1"/>
-          <p:nvPr/>
-        </p:nvSpPr>
-        <p:spPr>
-          <a:xfrm>
-            <a:off x="6704587" y="4225567"/>
-            <a:ext cx="373487" cy="369332"/>
-          </a:xfrm>
-          <a:prstGeom prst="rect">
-            <a:avLst/>
-          </a:prstGeom>
-          <a:noFill/>
-        </p:spPr>
-        <p:txBody>
-          <a:bodyPr wrap="square" rtlCol="0">
-            <a:spAutoFit/>
-          </a:bodyPr>
-          <a:lstStyle/>
-          <a:p>
-            <a:r>
-              <a:rPr lang="en-CA" dirty="0" smtClean="0"/>
-              <a:t>6</a:t>
-            </a:r>
-            <a:endParaRPr lang="en-CA" dirty="0"/>
-          </a:p>
-        </p:txBody>
-      </p:sp>
-      <p:sp>
-        <p:nvSpPr>
-          <p:cNvPr id="24" name="Flowchart: Connector 23"/>
-          <p:cNvSpPr/>
-          <p:nvPr/>
-        </p:nvSpPr>
-        <p:spPr>
-          <a:xfrm>
-            <a:off x="7237443" y="3107337"/>
-            <a:ext cx="257577" cy="227665"/>
-          </a:xfrm>
-          <a:prstGeom prst="flowChartConnector">
-            <a:avLst/>
-          </a:prstGeom>
-          <a:solidFill>
-            <a:schemeClr val="bg1"/>
-          </a:solidFill>
-          <a:ln>
-            <a:solidFill>
-              <a:schemeClr val="tx1"/>
-            </a:solidFill>
-          </a:ln>
-        </p:spPr>
-        <p:style>
-          <a:lnRef idx="2">
-            <a:schemeClr val="accent1">
-              <a:shade val="50000"/>
-            </a:schemeClr>
-          </a:lnRef>
-          <a:fillRef idx="1">
-            <a:schemeClr val="accent1"/>
-          </a:fillRef>
-          <a:effectRef idx="0">
-            <a:schemeClr val="accent1"/>
-          </a:effectRef>
-          <a:fontRef idx="minor">
-            <a:schemeClr val="lt1"/>
-          </a:fontRef>
-        </p:style>
-        <p:txBody>
-          <a:bodyPr rtlCol="0" anchor="ctr"/>
-          <a:lstStyle/>
-          <a:p>
-            <a:pPr algn="ctr"/>
-            <a:endParaRPr lang="en-CA"/>
-          </a:p>
-        </p:txBody>
-      </p:sp>
-      <p:sp>
-        <p:nvSpPr>
-          <p:cNvPr id="25" name="Flowchart: Connector 24"/>
-          <p:cNvSpPr/>
-          <p:nvPr/>
-        </p:nvSpPr>
-        <p:spPr>
-          <a:xfrm>
-            <a:off x="7232234" y="3710566"/>
-            <a:ext cx="257577" cy="227665"/>
-          </a:xfrm>
-          <a:prstGeom prst="flowChartConnector">
-            <a:avLst/>
-          </a:prstGeom>
-          <a:solidFill>
-            <a:schemeClr val="bg1"/>
-          </a:solidFill>
-          <a:ln>
-            <a:solidFill>
-              <a:schemeClr val="tx1"/>
-            </a:solidFill>
-          </a:ln>
-        </p:spPr>
-        <p:style>
-          <a:lnRef idx="2">
-            <a:schemeClr val="accent1">
-              <a:shade val="50000"/>
-            </a:schemeClr>
-          </a:lnRef>
-          <a:fillRef idx="1">
-            <a:schemeClr val="accent1"/>
-          </a:fillRef>
-          <a:effectRef idx="0">
-            <a:schemeClr val="accent1"/>
-          </a:effectRef>
-          <a:fontRef idx="minor">
-            <a:schemeClr val="lt1"/>
-          </a:fontRef>
-        </p:style>
-        <p:txBody>
-          <a:bodyPr rtlCol="0" anchor="ctr"/>
-          <a:lstStyle/>
-          <a:p>
-            <a:pPr algn="ctr"/>
-            <a:endParaRPr lang="en-CA"/>
-          </a:p>
-        </p:txBody>
-      </p:sp>
-      <p:sp>
-        <p:nvSpPr>
-          <p:cNvPr id="26" name="Flowchart: Connector 25"/>
-          <p:cNvSpPr/>
-          <p:nvPr/>
-        </p:nvSpPr>
-        <p:spPr>
-          <a:xfrm>
-            <a:off x="7232234" y="4313795"/>
-            <a:ext cx="257577" cy="227665"/>
-          </a:xfrm>
-          <a:prstGeom prst="flowChartConnector">
-            <a:avLst/>
-          </a:prstGeom>
-          <a:solidFill>
-            <a:schemeClr val="bg1"/>
-          </a:solidFill>
-          <a:ln>
-            <a:solidFill>
-              <a:schemeClr val="tx1"/>
-            </a:solidFill>
-          </a:ln>
-        </p:spPr>
-        <p:style>
-          <a:lnRef idx="2">
-            <a:schemeClr val="accent1">
-              <a:shade val="50000"/>
-            </a:schemeClr>
-          </a:lnRef>
-          <a:fillRef idx="1">
-            <a:schemeClr val="accent1"/>
-          </a:fillRef>
-          <a:effectRef idx="0">
-            <a:schemeClr val="accent1"/>
-          </a:effectRef>
-          <a:fontRef idx="minor">
-            <a:schemeClr val="lt1"/>
-          </a:fontRef>
-        </p:style>
-        <p:txBody>
-          <a:bodyPr rtlCol="0" anchor="ctr"/>
-          <a:lstStyle/>
-          <a:p>
-            <a:pPr algn="ctr"/>
-            <a:endParaRPr lang="en-CA"/>
-          </a:p>
-        </p:txBody>
-      </p:sp>
-      <p:sp>
-        <p:nvSpPr>
-          <p:cNvPr id="27" name="TextBox 26"/>
-          <p:cNvSpPr txBox="1"/>
-          <p:nvPr/>
-        </p:nvSpPr>
-        <p:spPr>
-          <a:xfrm>
-            <a:off x="5262308" y="3107337"/>
-            <a:ext cx="373487" cy="369332"/>
-          </a:xfrm>
-          <a:prstGeom prst="rect">
-            <a:avLst/>
-          </a:prstGeom>
-          <a:noFill/>
-        </p:spPr>
-        <p:txBody>
-          <a:bodyPr wrap="square" rtlCol="0">
-            <a:spAutoFit/>
-          </a:bodyPr>
-          <a:lstStyle/>
-          <a:p>
-            <a:r>
-              <a:rPr lang="en-CA" dirty="0" smtClean="0"/>
-              <a:t>1</a:t>
-            </a:r>
-            <a:endParaRPr lang="en-CA" dirty="0"/>
-          </a:p>
-        </p:txBody>
-      </p:sp>
-      <p:sp>
-        <p:nvSpPr>
-          <p:cNvPr id="28" name="TextBox 27"/>
-          <p:cNvSpPr txBox="1"/>
-          <p:nvPr/>
-        </p:nvSpPr>
-        <p:spPr>
-          <a:xfrm>
-            <a:off x="5262308" y="3635680"/>
-            <a:ext cx="373487" cy="369332"/>
-          </a:xfrm>
-          <a:prstGeom prst="rect">
-            <a:avLst/>
-          </a:prstGeom>
-          <a:noFill/>
-        </p:spPr>
-        <p:txBody>
-          <a:bodyPr wrap="square" rtlCol="0">
-            <a:spAutoFit/>
-          </a:bodyPr>
-          <a:lstStyle/>
-          <a:p>
-            <a:r>
-              <a:rPr lang="en-CA" dirty="0" smtClean="0"/>
-              <a:t>3</a:t>
-            </a:r>
-            <a:endParaRPr lang="en-CA" dirty="0"/>
-          </a:p>
-        </p:txBody>
-      </p:sp>
-      <p:sp>
-        <p:nvSpPr>
-          <p:cNvPr id="29" name="TextBox 28"/>
-          <p:cNvSpPr txBox="1"/>
-          <p:nvPr/>
-        </p:nvSpPr>
-        <p:spPr>
-          <a:xfrm>
-            <a:off x="5262308" y="4225567"/>
-            <a:ext cx="373487" cy="369332"/>
-          </a:xfrm>
-          <a:prstGeom prst="rect">
-            <a:avLst/>
-          </a:prstGeom>
-          <a:noFill/>
-        </p:spPr>
-        <p:txBody>
-          <a:bodyPr wrap="square" rtlCol="0">
-            <a:spAutoFit/>
-          </a:bodyPr>
-          <a:lstStyle/>
-          <a:p>
-            <a:r>
-              <a:rPr lang="en-CA" dirty="0" smtClean="0"/>
-              <a:t>5</a:t>
-            </a:r>
-            <a:endParaRPr lang="en-CA" dirty="0"/>
-          </a:p>
-        </p:txBody>
-      </p:sp>
-      <p:sp>
-        <p:nvSpPr>
-          <p:cNvPr id="30" name="Flowchart: Connector 29"/>
-          <p:cNvSpPr/>
-          <p:nvPr/>
-        </p:nvSpPr>
-        <p:spPr>
-          <a:xfrm>
-            <a:off x="5795164" y="3107337"/>
-            <a:ext cx="257577" cy="227665"/>
-          </a:xfrm>
-          <a:prstGeom prst="flowChartConnector">
-            <a:avLst/>
-          </a:prstGeom>
-          <a:solidFill>
-            <a:schemeClr val="bg1"/>
-          </a:solidFill>
-          <a:ln>
-            <a:solidFill>
-              <a:schemeClr val="tx1"/>
-            </a:solidFill>
-          </a:ln>
-        </p:spPr>
-        <p:style>
-          <a:lnRef idx="2">
-            <a:schemeClr val="accent1">
-              <a:shade val="50000"/>
-            </a:schemeClr>
-          </a:lnRef>
-          <a:fillRef idx="1">
-            <a:schemeClr val="accent1"/>
-          </a:fillRef>
-          <a:effectRef idx="0">
-            <a:schemeClr val="accent1"/>
-          </a:effectRef>
-          <a:fontRef idx="minor">
-            <a:schemeClr val="lt1"/>
-          </a:fontRef>
-        </p:style>
-        <p:txBody>
-          <a:bodyPr rtlCol="0" anchor="ctr"/>
-          <a:lstStyle/>
-          <a:p>
-            <a:pPr algn="ctr"/>
-            <a:endParaRPr lang="en-CA"/>
-          </a:p>
-        </p:txBody>
-      </p:sp>
-      <p:sp>
-        <p:nvSpPr>
-          <p:cNvPr id="31" name="Flowchart: Connector 30"/>
-          <p:cNvSpPr/>
-          <p:nvPr/>
-        </p:nvSpPr>
-        <p:spPr>
-          <a:xfrm>
-            <a:off x="5789955" y="3710566"/>
-            <a:ext cx="257577" cy="227665"/>
-          </a:xfrm>
-          <a:prstGeom prst="flowChartConnector">
-            <a:avLst/>
-          </a:prstGeom>
-          <a:solidFill>
-            <a:schemeClr val="bg1"/>
-          </a:solidFill>
-          <a:ln>
-            <a:solidFill>
-              <a:schemeClr val="tx1"/>
-            </a:solidFill>
-          </a:ln>
-        </p:spPr>
-        <p:style>
-          <a:lnRef idx="2">
-            <a:schemeClr val="accent1">
-              <a:shade val="50000"/>
-            </a:schemeClr>
-          </a:lnRef>
-          <a:fillRef idx="1">
-            <a:schemeClr val="accent1"/>
-          </a:fillRef>
-          <a:effectRef idx="0">
-            <a:schemeClr val="accent1"/>
-          </a:effectRef>
-          <a:fontRef idx="minor">
-            <a:schemeClr val="lt1"/>
-          </a:fontRef>
-        </p:style>
-        <p:txBody>
-          <a:bodyPr rtlCol="0" anchor="ctr"/>
-          <a:lstStyle/>
-          <a:p>
-            <a:pPr algn="ctr"/>
-            <a:endParaRPr lang="en-CA"/>
-          </a:p>
-        </p:txBody>
-      </p:sp>
-      <p:sp>
-        <p:nvSpPr>
-          <p:cNvPr id="32" name="Flowchart: Connector 31"/>
-          <p:cNvSpPr/>
-          <p:nvPr/>
-        </p:nvSpPr>
-        <p:spPr>
-          <a:xfrm>
-            <a:off x="5789955" y="4313795"/>
-            <a:ext cx="257577" cy="227665"/>
-          </a:xfrm>
-          <a:prstGeom prst="flowChartConnector">
-            <a:avLst/>
-          </a:prstGeom>
-          <a:solidFill>
-            <a:schemeClr val="bg1"/>
-          </a:solidFill>
-          <a:ln>
-            <a:solidFill>
-              <a:schemeClr val="tx1"/>
-            </a:solidFill>
-          </a:ln>
-        </p:spPr>
-        <p:style>
-          <a:lnRef idx="2">
-            <a:schemeClr val="accent1">
-              <a:shade val="50000"/>
-            </a:schemeClr>
-          </a:lnRef>
-          <a:fillRef idx="1">
-            <a:schemeClr val="accent1"/>
-          </a:fillRef>
-          <a:effectRef idx="0">
-            <a:schemeClr val="accent1"/>
-          </a:effectRef>
-          <a:fontRef idx="minor">
-            <a:schemeClr val="lt1"/>
-          </a:fontRef>
-        </p:style>
-        <p:txBody>
-          <a:bodyPr rtlCol="0" anchor="ctr"/>
-          <a:lstStyle/>
-          <a:p>
-            <a:pPr algn="ctr"/>
-            <a:endParaRPr lang="en-CA"/>
-          </a:p>
-        </p:txBody>
-      </p:sp>
-      <p:sp>
-        <p:nvSpPr>
-          <p:cNvPr id="33" name="Rounded Rectangle 32"/>
-          <p:cNvSpPr/>
-          <p:nvPr/>
-        </p:nvSpPr>
-        <p:spPr>
-          <a:xfrm>
-            <a:off x="2698482" y="4962934"/>
-            <a:ext cx="1068947" cy="386366"/>
-          </a:xfrm>
-          <a:prstGeom prst="roundRect">
-            <a:avLst/>
-          </a:prstGeom>
-          <a:solidFill>
-            <a:schemeClr val="bg1"/>
-          </a:solidFill>
-          <a:ln>
-            <a:solidFill>
-              <a:schemeClr val="tx1"/>
-            </a:solidFill>
-          </a:ln>
-        </p:spPr>
-        <p:style>
-          <a:lnRef idx="2">
-            <a:schemeClr val="accent1">
-              <a:shade val="50000"/>
-            </a:schemeClr>
-          </a:lnRef>
-          <a:fillRef idx="1">
-            <a:schemeClr val="accent1"/>
-          </a:fillRef>
-          <a:effectRef idx="0">
-            <a:schemeClr val="accent1"/>
-          </a:effectRef>
-          <a:fontRef idx="minor">
-            <a:schemeClr val="lt1"/>
-          </a:fontRef>
-        </p:style>
-        <p:txBody>
-          <a:bodyPr rtlCol="0" anchor="ctr"/>
-          <a:lstStyle/>
-          <a:p>
-            <a:pPr algn="ctr"/>
-            <a:endParaRPr lang="en-CA"/>
-          </a:p>
-        </p:txBody>
-      </p:sp>
-      <p:sp>
-        <p:nvSpPr>
-          <p:cNvPr id="34" name="TextBox 33"/>
-          <p:cNvSpPr txBox="1"/>
-          <p:nvPr/>
-        </p:nvSpPr>
-        <p:spPr>
-          <a:xfrm>
-            <a:off x="2866982" y="4954211"/>
-            <a:ext cx="622286" cy="369332"/>
+            <a:off x="9447589" y="4946139"/>
+            <a:ext cx="1038554" cy="369332"/>
           </a:xfrm>
           <a:prstGeom prst="rect">
             <a:avLst/>
@@ -9361,104 +9286,27 @@
           <a:p>
             <a:r>
               <a:rPr lang="en-CA" dirty="0" smtClean="0"/>
-              <a:t>Back</a:t>
+              <a:t>Continue</a:t>
             </a:r>
             <a:endParaRPr lang="en-CA" dirty="0"/>
-          </a:p>
-        </p:txBody>
-      </p:sp>
-      <p:sp>
-        <p:nvSpPr>
-          <p:cNvPr id="35" name="Flowchart: Connector 34"/>
-          <p:cNvSpPr/>
-          <p:nvPr/>
-        </p:nvSpPr>
-        <p:spPr>
-          <a:xfrm>
-            <a:off x="7234952" y="2496552"/>
-            <a:ext cx="257577" cy="227665"/>
-          </a:xfrm>
-          <a:prstGeom prst="flowChartConnector">
-            <a:avLst/>
-          </a:prstGeom>
-          <a:solidFill>
-            <a:schemeClr val="bg1"/>
-          </a:solidFill>
-          <a:ln>
-            <a:solidFill>
-              <a:schemeClr val="tx1"/>
-            </a:solidFill>
-          </a:ln>
-        </p:spPr>
-        <p:style>
-          <a:lnRef idx="2">
-            <a:schemeClr val="accent1">
-              <a:shade val="50000"/>
-            </a:schemeClr>
-          </a:lnRef>
-          <a:fillRef idx="1">
-            <a:schemeClr val="accent1"/>
-          </a:fillRef>
-          <a:effectRef idx="0">
-            <a:schemeClr val="accent1"/>
-          </a:effectRef>
-          <a:fontRef idx="minor">
-            <a:schemeClr val="lt1"/>
-          </a:fontRef>
-        </p:style>
-        <p:txBody>
-          <a:bodyPr rtlCol="0" anchor="ctr"/>
-          <a:lstStyle/>
-          <a:p>
-            <a:pPr algn="ctr"/>
-            <a:endParaRPr lang="en-CA"/>
-          </a:p>
-        </p:txBody>
-      </p:sp>
-      <p:sp>
-        <p:nvSpPr>
-          <p:cNvPr id="36" name="TextBox 35"/>
-          <p:cNvSpPr txBox="1"/>
-          <p:nvPr/>
-        </p:nvSpPr>
-        <p:spPr>
-          <a:xfrm>
-            <a:off x="5519885" y="2415099"/>
-            <a:ext cx="1558189" cy="338554"/>
-          </a:xfrm>
-          <a:prstGeom prst="rect">
-            <a:avLst/>
-          </a:prstGeom>
-          <a:noFill/>
-        </p:spPr>
-        <p:txBody>
-          <a:bodyPr wrap="square" rtlCol="0">
-            <a:spAutoFit/>
-          </a:bodyPr>
-          <a:lstStyle/>
-          <a:p>
-            <a:r>
-              <a:rPr lang="en-CA" sz="1600" dirty="0" smtClean="0"/>
-              <a:t>0 (AI simulation)</a:t>
-            </a:r>
-            <a:endParaRPr lang="en-CA" sz="1600" dirty="0"/>
           </a:p>
         </p:txBody>
       </p:sp>
       <p:cxnSp>
         <p:nvCxnSpPr>
-          <p:cNvPr id="37" name="Straight Connector 36"/>
+          <p:cNvPr id="18" name="Straight Connector 17"/>
           <p:cNvCxnSpPr/>
           <p:nvPr/>
         </p:nvCxnSpPr>
         <p:spPr>
-          <a:xfrm flipV="1">
-            <a:off x="8133987" y="1999600"/>
-            <a:ext cx="12879" cy="2688310"/>
+          <a:xfrm>
+            <a:off x="3653163" y="2979472"/>
+            <a:ext cx="75820" cy="66675"/>
           </a:xfrm>
           <a:prstGeom prst="line">
             <a:avLst/>
           </a:prstGeom>
+          <a:ln w="38100"/>
         </p:spPr>
         <p:style>
           <a:lnRef idx="1">
@@ -9475,192 +9323,99 @@
           </a:fontRef>
         </p:style>
       </p:cxnSp>
-      <p:sp>
-        <p:nvSpPr>
-          <p:cNvPr id="38" name="TextBox 37"/>
-          <p:cNvSpPr txBox="1"/>
-          <p:nvPr/>
-        </p:nvSpPr>
-        <p:spPr>
-          <a:xfrm>
-            <a:off x="8520478" y="1584102"/>
-            <a:ext cx="2118217" cy="646331"/>
-          </a:xfrm>
-          <a:prstGeom prst="rect">
-            <a:avLst/>
-          </a:prstGeom>
-          <a:noFill/>
-        </p:spPr>
-        <p:txBody>
-          <a:bodyPr wrap="square" rtlCol="0">
-            <a:spAutoFit/>
-          </a:bodyPr>
-          <a:lstStyle/>
-          <a:p>
-            <a:r>
-              <a:rPr lang="en-CA" dirty="0" smtClean="0"/>
-              <a:t>Board length on each side?</a:t>
-            </a:r>
-            <a:endParaRPr lang="en-CA" dirty="0"/>
-          </a:p>
-        </p:txBody>
-      </p:sp>
-      <p:sp>
-        <p:nvSpPr>
-          <p:cNvPr id="39" name="TextBox 38"/>
-          <p:cNvSpPr txBox="1"/>
-          <p:nvPr/>
-        </p:nvSpPr>
-        <p:spPr>
-          <a:xfrm>
-            <a:off x="9737576" y="2510910"/>
-            <a:ext cx="373487" cy="369332"/>
-          </a:xfrm>
-          <a:prstGeom prst="rect">
-            <a:avLst/>
-          </a:prstGeom>
-          <a:noFill/>
-        </p:spPr>
-        <p:txBody>
-          <a:bodyPr wrap="square" rtlCol="0">
-            <a:spAutoFit/>
-          </a:bodyPr>
-          <a:lstStyle/>
-          <a:p>
-            <a:r>
-              <a:rPr lang="en-CA" dirty="0"/>
-              <a:t>7</a:t>
-            </a:r>
-            <a:endParaRPr lang="en-CA" dirty="0"/>
-          </a:p>
-        </p:txBody>
-      </p:sp>
-      <p:sp>
-        <p:nvSpPr>
-          <p:cNvPr id="40" name="Flowchart: Connector 39"/>
-          <p:cNvSpPr/>
-          <p:nvPr/>
-        </p:nvSpPr>
-        <p:spPr>
-          <a:xfrm>
-            <a:off x="10265223" y="2599138"/>
-            <a:ext cx="257577" cy="227665"/>
-          </a:xfrm>
-          <a:prstGeom prst="flowChartConnector">
-            <a:avLst/>
-          </a:prstGeom>
-          <a:solidFill>
-            <a:schemeClr val="bg1"/>
-          </a:solidFill>
-          <a:ln>
-            <a:solidFill>
-              <a:schemeClr val="tx1"/>
-            </a:solidFill>
-          </a:ln>
-        </p:spPr>
-        <p:style>
-          <a:lnRef idx="2">
-            <a:schemeClr val="accent1">
-              <a:shade val="50000"/>
-            </a:schemeClr>
-          </a:lnRef>
-          <a:fillRef idx="1">
-            <a:schemeClr val="accent1"/>
-          </a:fillRef>
-          <a:effectRef idx="0">
-            <a:schemeClr val="accent1"/>
-          </a:effectRef>
-          <a:fontRef idx="minor">
-            <a:schemeClr val="lt1"/>
-          </a:fontRef>
-        </p:style>
-        <p:txBody>
-          <a:bodyPr rtlCol="0" anchor="ctr"/>
-          <a:lstStyle/>
-          <a:p>
-            <a:pPr algn="ctr"/>
-            <a:endParaRPr lang="en-CA"/>
-          </a:p>
-        </p:txBody>
-      </p:sp>
-      <p:sp>
-        <p:nvSpPr>
-          <p:cNvPr id="41" name="TextBox 40"/>
-          <p:cNvSpPr txBox="1"/>
-          <p:nvPr/>
-        </p:nvSpPr>
-        <p:spPr>
-          <a:xfrm>
-            <a:off x="8295297" y="2510910"/>
-            <a:ext cx="373487" cy="369332"/>
-          </a:xfrm>
-          <a:prstGeom prst="rect">
-            <a:avLst/>
-          </a:prstGeom>
-          <a:noFill/>
-        </p:spPr>
-        <p:txBody>
-          <a:bodyPr wrap="square" rtlCol="0">
-            <a:spAutoFit/>
-          </a:bodyPr>
-          <a:lstStyle/>
-          <a:p>
-            <a:r>
-              <a:rPr lang="en-CA" dirty="0" smtClean="0"/>
-              <a:t>5</a:t>
-            </a:r>
-            <a:endParaRPr lang="en-CA" dirty="0"/>
-          </a:p>
-        </p:txBody>
-      </p:sp>
-      <p:sp>
-        <p:nvSpPr>
-          <p:cNvPr id="42" name="Flowchart: Connector 41"/>
-          <p:cNvSpPr/>
-          <p:nvPr/>
-        </p:nvSpPr>
-        <p:spPr>
-          <a:xfrm>
-            <a:off x="8822944" y="2599138"/>
-            <a:ext cx="257577" cy="227665"/>
-          </a:xfrm>
-          <a:prstGeom prst="flowChartConnector">
-            <a:avLst/>
-          </a:prstGeom>
-          <a:solidFill>
-            <a:schemeClr val="bg1"/>
-          </a:solidFill>
-          <a:ln>
-            <a:solidFill>
-              <a:schemeClr val="tx1"/>
-            </a:solidFill>
-          </a:ln>
-        </p:spPr>
-        <p:style>
-          <a:lnRef idx="2">
-            <a:schemeClr val="accent1">
-              <a:shade val="50000"/>
-            </a:schemeClr>
-          </a:lnRef>
-          <a:fillRef idx="1">
-            <a:schemeClr val="accent1"/>
-          </a:fillRef>
-          <a:effectRef idx="0">
-            <a:schemeClr val="accent1"/>
-          </a:effectRef>
-          <a:fontRef idx="minor">
-            <a:schemeClr val="lt1"/>
-          </a:fontRef>
-        </p:style>
-        <p:txBody>
-          <a:bodyPr rtlCol="0" anchor="ctr"/>
-          <a:lstStyle/>
-          <a:p>
-            <a:pPr algn="ctr"/>
-            <a:endParaRPr lang="en-CA"/>
-          </a:p>
-        </p:txBody>
-      </p:sp>
+      <p:cxnSp>
+        <p:nvCxnSpPr>
+          <p:cNvPr id="68" name="Straight Connector 67"/>
+          <p:cNvCxnSpPr/>
+          <p:nvPr/>
+        </p:nvCxnSpPr>
+        <p:spPr>
+          <a:xfrm flipV="1">
+            <a:off x="3736180" y="2893747"/>
+            <a:ext cx="212858" cy="171450"/>
+          </a:xfrm>
+          <a:prstGeom prst="line">
+            <a:avLst/>
+          </a:prstGeom>
+          <a:ln w="38100"/>
+        </p:spPr>
+        <p:style>
+          <a:lnRef idx="1">
+            <a:schemeClr val="dk1"/>
+          </a:lnRef>
+          <a:fillRef idx="0">
+            <a:schemeClr val="dk1"/>
+          </a:fillRef>
+          <a:effectRef idx="0">
+            <a:schemeClr val="dk1"/>
+          </a:effectRef>
+          <a:fontRef idx="minor">
+            <a:schemeClr val="tx1"/>
+          </a:fontRef>
+        </p:style>
+      </p:cxnSp>
+      <p:cxnSp>
+        <p:nvCxnSpPr>
+          <p:cNvPr id="75" name="Straight Connector 74"/>
+          <p:cNvCxnSpPr/>
+          <p:nvPr/>
+        </p:nvCxnSpPr>
+        <p:spPr>
+          <a:xfrm>
+            <a:off x="3668865" y="4577525"/>
+            <a:ext cx="75820" cy="66675"/>
+          </a:xfrm>
+          <a:prstGeom prst="line">
+            <a:avLst/>
+          </a:prstGeom>
+          <a:ln w="38100"/>
+        </p:spPr>
+        <p:style>
+          <a:lnRef idx="1">
+            <a:schemeClr val="dk1"/>
+          </a:lnRef>
+          <a:fillRef idx="0">
+            <a:schemeClr val="dk1"/>
+          </a:fillRef>
+          <a:effectRef idx="0">
+            <a:schemeClr val="dk1"/>
+          </a:effectRef>
+          <a:fontRef idx="minor">
+            <a:schemeClr val="tx1"/>
+          </a:fontRef>
+        </p:style>
+      </p:cxnSp>
+      <p:cxnSp>
+        <p:nvCxnSpPr>
+          <p:cNvPr id="76" name="Straight Connector 75"/>
+          <p:cNvCxnSpPr/>
+          <p:nvPr/>
+        </p:nvCxnSpPr>
+        <p:spPr>
+          <a:xfrm flipV="1">
+            <a:off x="3751882" y="4491800"/>
+            <a:ext cx="212858" cy="171450"/>
+          </a:xfrm>
+          <a:prstGeom prst="line">
+            <a:avLst/>
+          </a:prstGeom>
+          <a:ln w="38100"/>
+        </p:spPr>
+        <p:style>
+          <a:lnRef idx="1">
+            <a:schemeClr val="dk1"/>
+          </a:lnRef>
+          <a:fillRef idx="0">
+            <a:schemeClr val="dk1"/>
+          </a:fillRef>
+          <a:effectRef idx="0">
+            <a:schemeClr val="dk1"/>
+          </a:effectRef>
+          <a:fontRef idx="minor">
+            <a:schemeClr val="tx1"/>
+          </a:fontRef>
+        </p:style>
+      </p:cxnSp>
     </p:spTree>
     <p:extLst>
       <p:ext uri="{BB962C8B-B14F-4D97-AF65-F5344CB8AC3E}">
@@ -9779,7 +9534,7 @@
         </p:nvSpPr>
         <p:spPr>
           <a:xfrm>
-            <a:off x="5576552" y="5886878"/>
+            <a:off x="1492274" y="5049751"/>
             <a:ext cx="1068947" cy="386366"/>
           </a:xfrm>
           <a:prstGeom prst="roundRect">
@@ -9827,7 +9582,7 @@
         </p:nvSpPr>
         <p:spPr>
           <a:xfrm>
-            <a:off x="5815110" y="5895395"/>
+            <a:off x="1730832" y="5049751"/>
             <a:ext cx="591829" cy="369332"/>
           </a:xfrm>
           <a:prstGeom prst="rect">
@@ -9846,6 +9601,2312 @@
               <a:t>Quit</a:t>
             </a:r>
             <a:endParaRPr lang="en-CA" dirty="0"/>
+          </a:p>
+        </p:txBody>
+      </p:sp>
+      <p:sp>
+        <p:nvSpPr>
+          <p:cNvPr id="2" name="TextBox 1"/>
+          <p:cNvSpPr txBox="1"/>
+          <p:nvPr/>
+        </p:nvSpPr>
+        <p:spPr>
+          <a:xfrm>
+            <a:off x="1358121" y="3084284"/>
+            <a:ext cx="1929080" cy="369332"/>
+          </a:xfrm>
+          <a:prstGeom prst="rect">
+            <a:avLst/>
+          </a:prstGeom>
+          <a:noFill/>
+        </p:spPr>
+        <p:txBody>
+          <a:bodyPr wrap="square" rtlCol="0">
+            <a:spAutoFit/>
+          </a:bodyPr>
+          <a:lstStyle/>
+          <a:p>
+            <a:r>
+              <a:rPr lang="en-CA" dirty="0" smtClean="0"/>
+              <a:t>Team Yellow</a:t>
+            </a:r>
+            <a:endParaRPr lang="en-CA" dirty="0"/>
+          </a:p>
+        </p:txBody>
+      </p:sp>
+      <p:sp>
+        <p:nvSpPr>
+          <p:cNvPr id="7" name="TextBox 6"/>
+          <p:cNvSpPr txBox="1"/>
+          <p:nvPr/>
+        </p:nvSpPr>
+        <p:spPr>
+          <a:xfrm>
+            <a:off x="1358121" y="2191269"/>
+            <a:ext cx="1929080" cy="369332"/>
+          </a:xfrm>
+          <a:prstGeom prst="rect">
+            <a:avLst/>
+          </a:prstGeom>
+          <a:noFill/>
+        </p:spPr>
+        <p:txBody>
+          <a:bodyPr wrap="square" rtlCol="0">
+            <a:spAutoFit/>
+          </a:bodyPr>
+          <a:lstStyle/>
+          <a:p>
+            <a:r>
+              <a:rPr lang="en-CA" dirty="0" smtClean="0"/>
+              <a:t>Team Orange</a:t>
+            </a:r>
+            <a:endParaRPr lang="en-CA" dirty="0"/>
+          </a:p>
+        </p:txBody>
+      </p:sp>
+      <p:sp>
+        <p:nvSpPr>
+          <p:cNvPr id="8" name="TextBox 7"/>
+          <p:cNvSpPr txBox="1"/>
+          <p:nvPr/>
+        </p:nvSpPr>
+        <p:spPr>
+          <a:xfrm>
+            <a:off x="1492274" y="1393202"/>
+            <a:ext cx="1929080" cy="369332"/>
+          </a:xfrm>
+          <a:prstGeom prst="rect">
+            <a:avLst/>
+          </a:prstGeom>
+          <a:noFill/>
+        </p:spPr>
+        <p:txBody>
+          <a:bodyPr wrap="square" rtlCol="0">
+            <a:spAutoFit/>
+          </a:bodyPr>
+          <a:lstStyle/>
+          <a:p>
+            <a:r>
+              <a:rPr lang="en-CA" dirty="0" smtClean="0"/>
+              <a:t>Team Red</a:t>
+            </a:r>
+            <a:endParaRPr lang="en-CA" dirty="0"/>
+          </a:p>
+        </p:txBody>
+      </p:sp>
+      <p:sp>
+        <p:nvSpPr>
+          <p:cNvPr id="10" name="TextBox 9"/>
+          <p:cNvSpPr txBox="1"/>
+          <p:nvPr/>
+        </p:nvSpPr>
+        <p:spPr>
+          <a:xfrm>
+            <a:off x="8964753" y="3268950"/>
+            <a:ext cx="1929080" cy="369332"/>
+          </a:xfrm>
+          <a:prstGeom prst="rect">
+            <a:avLst/>
+          </a:prstGeom>
+          <a:noFill/>
+        </p:spPr>
+        <p:txBody>
+          <a:bodyPr wrap="square" rtlCol="0">
+            <a:spAutoFit/>
+          </a:bodyPr>
+          <a:lstStyle/>
+          <a:p>
+            <a:r>
+              <a:rPr lang="en-CA" dirty="0" smtClean="0"/>
+              <a:t>Team Purple</a:t>
+            </a:r>
+            <a:endParaRPr lang="en-CA" dirty="0"/>
+          </a:p>
+        </p:txBody>
+      </p:sp>
+      <p:sp>
+        <p:nvSpPr>
+          <p:cNvPr id="11" name="TextBox 10"/>
+          <p:cNvSpPr txBox="1"/>
+          <p:nvPr/>
+        </p:nvSpPr>
+        <p:spPr>
+          <a:xfrm>
+            <a:off x="9090605" y="2335369"/>
+            <a:ext cx="1929080" cy="369332"/>
+          </a:xfrm>
+          <a:prstGeom prst="rect">
+            <a:avLst/>
+          </a:prstGeom>
+          <a:noFill/>
+        </p:spPr>
+        <p:txBody>
+          <a:bodyPr wrap="square" rtlCol="0">
+            <a:spAutoFit/>
+          </a:bodyPr>
+          <a:lstStyle/>
+          <a:p>
+            <a:r>
+              <a:rPr lang="en-CA" dirty="0" smtClean="0"/>
+              <a:t>Team Blue</a:t>
+            </a:r>
+            <a:endParaRPr lang="en-CA" dirty="0"/>
+          </a:p>
+        </p:txBody>
+      </p:sp>
+      <p:sp>
+        <p:nvSpPr>
+          <p:cNvPr id="12" name="TextBox 11"/>
+          <p:cNvSpPr txBox="1"/>
+          <p:nvPr/>
+        </p:nvSpPr>
+        <p:spPr>
+          <a:xfrm>
+            <a:off x="8988816" y="1365984"/>
+            <a:ext cx="1929080" cy="369332"/>
+          </a:xfrm>
+          <a:prstGeom prst="rect">
+            <a:avLst/>
+          </a:prstGeom>
+          <a:noFill/>
+        </p:spPr>
+        <p:txBody>
+          <a:bodyPr wrap="square" rtlCol="0">
+            <a:spAutoFit/>
+          </a:bodyPr>
+          <a:lstStyle/>
+          <a:p>
+            <a:r>
+              <a:rPr lang="en-CA" dirty="0" smtClean="0"/>
+              <a:t>Team Green</a:t>
+            </a:r>
+            <a:endParaRPr lang="en-CA" dirty="0"/>
+          </a:p>
+        </p:txBody>
+      </p:sp>
+      <p:sp>
+        <p:nvSpPr>
+          <p:cNvPr id="3" name="TextBox 2"/>
+          <p:cNvSpPr txBox="1"/>
+          <p:nvPr/>
+        </p:nvSpPr>
+        <p:spPr>
+          <a:xfrm>
+            <a:off x="8596385" y="4526693"/>
+            <a:ext cx="2025334" cy="923330"/>
+          </a:xfrm>
+          <a:prstGeom prst="rect">
+            <a:avLst/>
+          </a:prstGeom>
+          <a:noFill/>
+        </p:spPr>
+        <p:txBody>
+          <a:bodyPr wrap="square" rtlCol="0">
+            <a:spAutoFit/>
+          </a:bodyPr>
+          <a:lstStyle/>
+          <a:p>
+            <a:r>
+              <a:rPr lang="en-CA" dirty="0" smtClean="0"/>
+              <a:t>Current Robot:</a:t>
+            </a:r>
+          </a:p>
+          <a:p>
+            <a:r>
+              <a:rPr lang="en-CA" dirty="0" smtClean="0"/>
+              <a:t>Moves left:</a:t>
+            </a:r>
+          </a:p>
+          <a:p>
+            <a:endParaRPr lang="en-CA" dirty="0"/>
+          </a:p>
+        </p:txBody>
+      </p:sp>
+      <p:cxnSp>
+        <p:nvCxnSpPr>
+          <p:cNvPr id="14" name="Straight Connector 13"/>
+          <p:cNvCxnSpPr/>
+          <p:nvPr/>
+        </p:nvCxnSpPr>
+        <p:spPr>
+          <a:xfrm flipV="1">
+            <a:off x="8618550" y="4340658"/>
+            <a:ext cx="2286504" cy="8586"/>
+          </a:xfrm>
+          <a:prstGeom prst="line">
+            <a:avLst/>
+          </a:prstGeom>
+        </p:spPr>
+        <p:style>
+          <a:lnRef idx="1">
+            <a:schemeClr val="accent1"/>
+          </a:lnRef>
+          <a:fillRef idx="0">
+            <a:schemeClr val="accent1"/>
+          </a:fillRef>
+          <a:effectRef idx="0">
+            <a:schemeClr val="accent1"/>
+          </a:effectRef>
+          <a:fontRef idx="minor">
+            <a:schemeClr val="tx1"/>
+          </a:fontRef>
+        </p:style>
+      </p:cxnSp>
+      <p:sp>
+        <p:nvSpPr>
+          <p:cNvPr id="16" name="Rounded Rectangle 15"/>
+          <p:cNvSpPr/>
+          <p:nvPr/>
+        </p:nvSpPr>
+        <p:spPr>
+          <a:xfrm>
+            <a:off x="1492274" y="4472667"/>
+            <a:ext cx="1068947" cy="386366"/>
+          </a:xfrm>
+          <a:prstGeom prst="roundRect">
+            <a:avLst/>
+          </a:prstGeom>
+          <a:solidFill>
+            <a:schemeClr val="bg1"/>
+          </a:solidFill>
+          <a:ln>
+            <a:solidFill>
+              <a:schemeClr val="tx1"/>
+            </a:solidFill>
+          </a:ln>
+        </p:spPr>
+        <p:style>
+          <a:lnRef idx="2">
+            <a:schemeClr val="accent1">
+              <a:shade val="50000"/>
+            </a:schemeClr>
+          </a:lnRef>
+          <a:fillRef idx="1">
+            <a:schemeClr val="accent1"/>
+          </a:fillRef>
+          <a:effectRef idx="0">
+            <a:schemeClr val="accent1"/>
+          </a:effectRef>
+          <a:fontRef idx="minor">
+            <a:schemeClr val="lt1"/>
+          </a:fontRef>
+        </p:style>
+        <p:txBody>
+          <a:bodyPr rtlCol="0" anchor="ctr"/>
+          <a:lstStyle/>
+          <a:p>
+            <a:pPr algn="ctr"/>
+            <a:endParaRPr lang="en-CA"/>
+          </a:p>
+        </p:txBody>
+      </p:sp>
+      <p:sp>
+        <p:nvSpPr>
+          <p:cNvPr id="17" name="TextBox 16"/>
+          <p:cNvSpPr txBox="1"/>
+          <p:nvPr/>
+        </p:nvSpPr>
+        <p:spPr>
+          <a:xfrm>
+            <a:off x="1691898" y="4489701"/>
+            <a:ext cx="695459" cy="369332"/>
+          </a:xfrm>
+          <a:prstGeom prst="rect">
+            <a:avLst/>
+          </a:prstGeom>
+          <a:noFill/>
+        </p:spPr>
+        <p:txBody>
+          <a:bodyPr wrap="square" rtlCol="0">
+            <a:spAutoFit/>
+          </a:bodyPr>
+          <a:lstStyle/>
+          <a:p>
+            <a:r>
+              <a:rPr lang="en-CA" dirty="0" smtClean="0"/>
+              <a:t>Help</a:t>
+            </a:r>
+            <a:endParaRPr lang="en-CA" dirty="0"/>
+          </a:p>
+        </p:txBody>
+      </p:sp>
+      <p:sp>
+        <p:nvSpPr>
+          <p:cNvPr id="18" name="TextBox 17"/>
+          <p:cNvSpPr txBox="1"/>
+          <p:nvPr/>
+        </p:nvSpPr>
+        <p:spPr>
+          <a:xfrm>
+            <a:off x="1300007" y="1632552"/>
+            <a:ext cx="1468192" cy="646331"/>
+          </a:xfrm>
+          <a:prstGeom prst="rect">
+            <a:avLst/>
+          </a:prstGeom>
+          <a:noFill/>
+        </p:spPr>
+        <p:txBody>
+          <a:bodyPr wrap="square" rtlCol="0">
+            <a:spAutoFit/>
+          </a:bodyPr>
+          <a:lstStyle/>
+          <a:p>
+            <a:r>
+              <a:rPr lang="en-CA" sz="1200" dirty="0" smtClean="0"/>
+              <a:t>Scout </a:t>
+            </a:r>
+          </a:p>
+          <a:p>
+            <a:r>
+              <a:rPr lang="en-CA" sz="1200" dirty="0" smtClean="0"/>
+              <a:t>Sniper   </a:t>
+            </a:r>
+          </a:p>
+          <a:p>
+            <a:r>
+              <a:rPr lang="en-CA" sz="1200" dirty="0" smtClean="0"/>
+              <a:t>Tank</a:t>
+            </a:r>
+            <a:endParaRPr lang="en-CA" sz="1200" dirty="0"/>
+          </a:p>
+        </p:txBody>
+      </p:sp>
+      <p:sp>
+        <p:nvSpPr>
+          <p:cNvPr id="19" name="TextBox 18"/>
+          <p:cNvSpPr txBox="1"/>
+          <p:nvPr/>
+        </p:nvSpPr>
+        <p:spPr>
+          <a:xfrm>
+            <a:off x="8742439" y="1632552"/>
+            <a:ext cx="1468192" cy="646331"/>
+          </a:xfrm>
+          <a:prstGeom prst="rect">
+            <a:avLst/>
+          </a:prstGeom>
+          <a:noFill/>
+        </p:spPr>
+        <p:txBody>
+          <a:bodyPr wrap="square" rtlCol="0">
+            <a:spAutoFit/>
+          </a:bodyPr>
+          <a:lstStyle/>
+          <a:p>
+            <a:r>
+              <a:rPr lang="en-CA" sz="1200" dirty="0" smtClean="0"/>
+              <a:t>Scout    </a:t>
+            </a:r>
+          </a:p>
+          <a:p>
+            <a:r>
+              <a:rPr lang="en-CA" sz="1200" dirty="0" smtClean="0"/>
+              <a:t>Sniper   </a:t>
+            </a:r>
+          </a:p>
+          <a:p>
+            <a:r>
+              <a:rPr lang="en-CA" sz="1200" dirty="0" smtClean="0"/>
+              <a:t>Tank</a:t>
+            </a:r>
+            <a:endParaRPr lang="en-CA" sz="1200" dirty="0"/>
+          </a:p>
+        </p:txBody>
+      </p:sp>
+      <p:sp>
+        <p:nvSpPr>
+          <p:cNvPr id="20" name="TextBox 19"/>
+          <p:cNvSpPr txBox="1"/>
+          <p:nvPr/>
+        </p:nvSpPr>
+        <p:spPr>
+          <a:xfrm>
+            <a:off x="8728764" y="2546425"/>
+            <a:ext cx="1468192" cy="646331"/>
+          </a:xfrm>
+          <a:prstGeom prst="rect">
+            <a:avLst/>
+          </a:prstGeom>
+          <a:noFill/>
+        </p:spPr>
+        <p:txBody>
+          <a:bodyPr wrap="square" rtlCol="0">
+            <a:spAutoFit/>
+          </a:bodyPr>
+          <a:lstStyle/>
+          <a:p>
+            <a:r>
+              <a:rPr lang="en-CA" sz="1200" dirty="0" smtClean="0"/>
+              <a:t>Scout    </a:t>
+            </a:r>
+          </a:p>
+          <a:p>
+            <a:r>
+              <a:rPr lang="en-CA" sz="1200" dirty="0" smtClean="0"/>
+              <a:t>Sniper   </a:t>
+            </a:r>
+          </a:p>
+          <a:p>
+            <a:r>
+              <a:rPr lang="en-CA" sz="1200" dirty="0" smtClean="0"/>
+              <a:t>Tank</a:t>
+            </a:r>
+            <a:endParaRPr lang="en-CA" sz="1200" dirty="0"/>
+          </a:p>
+        </p:txBody>
+      </p:sp>
+      <p:sp>
+        <p:nvSpPr>
+          <p:cNvPr id="21" name="TextBox 20"/>
+          <p:cNvSpPr txBox="1"/>
+          <p:nvPr/>
+        </p:nvSpPr>
+        <p:spPr>
+          <a:xfrm>
+            <a:off x="1312281" y="2426226"/>
+            <a:ext cx="1468192" cy="646331"/>
+          </a:xfrm>
+          <a:prstGeom prst="rect">
+            <a:avLst/>
+          </a:prstGeom>
+          <a:noFill/>
+        </p:spPr>
+        <p:txBody>
+          <a:bodyPr wrap="square" rtlCol="0">
+            <a:spAutoFit/>
+          </a:bodyPr>
+          <a:lstStyle/>
+          <a:p>
+            <a:r>
+              <a:rPr lang="en-CA" sz="1200" dirty="0" smtClean="0"/>
+              <a:t>Scout    </a:t>
+            </a:r>
+          </a:p>
+          <a:p>
+            <a:r>
+              <a:rPr lang="en-CA" sz="1200" dirty="0" smtClean="0"/>
+              <a:t>Sniper   </a:t>
+            </a:r>
+          </a:p>
+          <a:p>
+            <a:r>
+              <a:rPr lang="en-CA" sz="1200" dirty="0" smtClean="0"/>
+              <a:t>Tank</a:t>
+            </a:r>
+            <a:endParaRPr lang="en-CA" sz="1200" dirty="0"/>
+          </a:p>
+        </p:txBody>
+      </p:sp>
+      <p:sp>
+        <p:nvSpPr>
+          <p:cNvPr id="22" name="TextBox 21"/>
+          <p:cNvSpPr txBox="1"/>
+          <p:nvPr/>
+        </p:nvSpPr>
+        <p:spPr>
+          <a:xfrm>
+            <a:off x="1300007" y="3296159"/>
+            <a:ext cx="1468192" cy="646331"/>
+          </a:xfrm>
+          <a:prstGeom prst="rect">
+            <a:avLst/>
+          </a:prstGeom>
+          <a:noFill/>
+        </p:spPr>
+        <p:txBody>
+          <a:bodyPr wrap="square" rtlCol="0">
+            <a:spAutoFit/>
+          </a:bodyPr>
+          <a:lstStyle/>
+          <a:p>
+            <a:r>
+              <a:rPr lang="en-CA" sz="1200" dirty="0" smtClean="0"/>
+              <a:t>Scout    </a:t>
+            </a:r>
+          </a:p>
+          <a:p>
+            <a:r>
+              <a:rPr lang="en-CA" sz="1200" dirty="0" smtClean="0"/>
+              <a:t>Sniper   </a:t>
+            </a:r>
+          </a:p>
+          <a:p>
+            <a:r>
+              <a:rPr lang="en-CA" sz="1200" dirty="0" smtClean="0"/>
+              <a:t>Tank</a:t>
+            </a:r>
+            <a:endParaRPr lang="en-CA" sz="1200" dirty="0"/>
+          </a:p>
+        </p:txBody>
+      </p:sp>
+      <p:sp>
+        <p:nvSpPr>
+          <p:cNvPr id="23" name="TextBox 22"/>
+          <p:cNvSpPr txBox="1"/>
+          <p:nvPr/>
+        </p:nvSpPr>
+        <p:spPr>
+          <a:xfrm>
+            <a:off x="8747068" y="3516878"/>
+            <a:ext cx="1468192" cy="646331"/>
+          </a:xfrm>
+          <a:prstGeom prst="rect">
+            <a:avLst/>
+          </a:prstGeom>
+          <a:noFill/>
+        </p:spPr>
+        <p:txBody>
+          <a:bodyPr wrap="square" rtlCol="0">
+            <a:spAutoFit/>
+          </a:bodyPr>
+          <a:lstStyle/>
+          <a:p>
+            <a:r>
+              <a:rPr lang="en-CA" sz="1200" dirty="0" smtClean="0"/>
+              <a:t>Scout    </a:t>
+            </a:r>
+          </a:p>
+          <a:p>
+            <a:r>
+              <a:rPr lang="en-CA" sz="1200" dirty="0" smtClean="0"/>
+              <a:t>Sniper   </a:t>
+            </a:r>
+          </a:p>
+          <a:p>
+            <a:r>
+              <a:rPr lang="en-CA" sz="1200" dirty="0" smtClean="0"/>
+              <a:t>Tank</a:t>
+            </a:r>
+            <a:endParaRPr lang="en-CA" sz="1200" dirty="0"/>
+          </a:p>
+        </p:txBody>
+      </p:sp>
+      <p:sp>
+        <p:nvSpPr>
+          <p:cNvPr id="24" name="Rectangle 23"/>
+          <p:cNvSpPr/>
+          <p:nvPr/>
+        </p:nvSpPr>
+        <p:spPr>
+          <a:xfrm>
+            <a:off x="1905252" y="1718454"/>
+            <a:ext cx="110847" cy="111614"/>
+          </a:xfrm>
+          <a:prstGeom prst="rect">
+            <a:avLst/>
+          </a:prstGeom>
+          <a:solidFill>
+            <a:srgbClr val="FF0000"/>
+          </a:solidFill>
+          <a:ln>
+            <a:solidFill>
+              <a:schemeClr val="tx1"/>
+            </a:solidFill>
+          </a:ln>
+        </p:spPr>
+        <p:style>
+          <a:lnRef idx="2">
+            <a:schemeClr val="accent1">
+              <a:shade val="50000"/>
+            </a:schemeClr>
+          </a:lnRef>
+          <a:fillRef idx="1">
+            <a:schemeClr val="accent1"/>
+          </a:fillRef>
+          <a:effectRef idx="0">
+            <a:schemeClr val="accent1"/>
+          </a:effectRef>
+          <a:fontRef idx="minor">
+            <a:schemeClr val="lt1"/>
+          </a:fontRef>
+        </p:style>
+        <p:txBody>
+          <a:bodyPr rtlCol="0" anchor="ctr"/>
+          <a:lstStyle/>
+          <a:p>
+            <a:pPr algn="ctr"/>
+            <a:endParaRPr lang="en-CA"/>
+          </a:p>
+        </p:txBody>
+      </p:sp>
+      <p:sp>
+        <p:nvSpPr>
+          <p:cNvPr id="25" name="Rectangle 24"/>
+          <p:cNvSpPr/>
+          <p:nvPr/>
+        </p:nvSpPr>
+        <p:spPr>
+          <a:xfrm>
+            <a:off x="1905250" y="2062621"/>
+            <a:ext cx="110847" cy="111614"/>
+          </a:xfrm>
+          <a:prstGeom prst="rect">
+            <a:avLst/>
+          </a:prstGeom>
+          <a:solidFill>
+            <a:srgbClr val="FF0000"/>
+          </a:solidFill>
+          <a:ln>
+            <a:solidFill>
+              <a:schemeClr val="tx1"/>
+            </a:solidFill>
+          </a:ln>
+        </p:spPr>
+        <p:style>
+          <a:lnRef idx="2">
+            <a:schemeClr val="accent1">
+              <a:shade val="50000"/>
+            </a:schemeClr>
+          </a:lnRef>
+          <a:fillRef idx="1">
+            <a:schemeClr val="accent1"/>
+          </a:fillRef>
+          <a:effectRef idx="0">
+            <a:schemeClr val="accent1"/>
+          </a:effectRef>
+          <a:fontRef idx="minor">
+            <a:schemeClr val="lt1"/>
+          </a:fontRef>
+        </p:style>
+        <p:txBody>
+          <a:bodyPr rtlCol="0" anchor="ctr"/>
+          <a:lstStyle/>
+          <a:p>
+            <a:pPr algn="ctr"/>
+            <a:endParaRPr lang="en-CA"/>
+          </a:p>
+        </p:txBody>
+      </p:sp>
+      <p:sp>
+        <p:nvSpPr>
+          <p:cNvPr id="26" name="Rectangle 25"/>
+          <p:cNvSpPr/>
+          <p:nvPr/>
+        </p:nvSpPr>
+        <p:spPr>
+          <a:xfrm>
+            <a:off x="1905251" y="1881545"/>
+            <a:ext cx="110847" cy="111614"/>
+          </a:xfrm>
+          <a:prstGeom prst="rect">
+            <a:avLst/>
+          </a:prstGeom>
+          <a:solidFill>
+            <a:srgbClr val="FF0000"/>
+          </a:solidFill>
+          <a:ln>
+            <a:solidFill>
+              <a:schemeClr val="tx1"/>
+            </a:solidFill>
+          </a:ln>
+        </p:spPr>
+        <p:style>
+          <a:lnRef idx="2">
+            <a:schemeClr val="accent1">
+              <a:shade val="50000"/>
+            </a:schemeClr>
+          </a:lnRef>
+          <a:fillRef idx="1">
+            <a:schemeClr val="accent1"/>
+          </a:fillRef>
+          <a:effectRef idx="0">
+            <a:schemeClr val="accent1"/>
+          </a:effectRef>
+          <a:fontRef idx="minor">
+            <a:schemeClr val="lt1"/>
+          </a:fontRef>
+        </p:style>
+        <p:txBody>
+          <a:bodyPr rtlCol="0" anchor="ctr"/>
+          <a:lstStyle/>
+          <a:p>
+            <a:pPr algn="ctr"/>
+            <a:endParaRPr lang="en-CA"/>
+          </a:p>
+        </p:txBody>
+      </p:sp>
+      <p:sp>
+        <p:nvSpPr>
+          <p:cNvPr id="27" name="Rectangle 26"/>
+          <p:cNvSpPr/>
+          <p:nvPr/>
+        </p:nvSpPr>
+        <p:spPr>
+          <a:xfrm>
+            <a:off x="2084796" y="1883236"/>
+            <a:ext cx="110847" cy="111614"/>
+          </a:xfrm>
+          <a:prstGeom prst="rect">
+            <a:avLst/>
+          </a:prstGeom>
+          <a:solidFill>
+            <a:srgbClr val="FF0000"/>
+          </a:solidFill>
+          <a:ln>
+            <a:solidFill>
+              <a:schemeClr val="tx1"/>
+            </a:solidFill>
+          </a:ln>
+        </p:spPr>
+        <p:style>
+          <a:lnRef idx="2">
+            <a:schemeClr val="accent1">
+              <a:shade val="50000"/>
+            </a:schemeClr>
+          </a:lnRef>
+          <a:fillRef idx="1">
+            <a:schemeClr val="accent1"/>
+          </a:fillRef>
+          <a:effectRef idx="0">
+            <a:schemeClr val="accent1"/>
+          </a:effectRef>
+          <a:fontRef idx="minor">
+            <a:schemeClr val="lt1"/>
+          </a:fontRef>
+        </p:style>
+        <p:txBody>
+          <a:bodyPr rtlCol="0" anchor="ctr"/>
+          <a:lstStyle/>
+          <a:p>
+            <a:pPr algn="ctr"/>
+            <a:endParaRPr lang="en-CA"/>
+          </a:p>
+        </p:txBody>
+      </p:sp>
+      <p:sp>
+        <p:nvSpPr>
+          <p:cNvPr id="28" name="Rectangle 27"/>
+          <p:cNvSpPr/>
+          <p:nvPr/>
+        </p:nvSpPr>
+        <p:spPr>
+          <a:xfrm>
+            <a:off x="2297440" y="2062762"/>
+            <a:ext cx="110847" cy="111614"/>
+          </a:xfrm>
+          <a:prstGeom prst="rect">
+            <a:avLst/>
+          </a:prstGeom>
+          <a:solidFill>
+            <a:srgbClr val="FF0000"/>
+          </a:solidFill>
+          <a:ln>
+            <a:solidFill>
+              <a:schemeClr val="tx1"/>
+            </a:solidFill>
+          </a:ln>
+        </p:spPr>
+        <p:style>
+          <a:lnRef idx="2">
+            <a:schemeClr val="accent1">
+              <a:shade val="50000"/>
+            </a:schemeClr>
+          </a:lnRef>
+          <a:fillRef idx="1">
+            <a:schemeClr val="accent1"/>
+          </a:fillRef>
+          <a:effectRef idx="0">
+            <a:schemeClr val="accent1"/>
+          </a:effectRef>
+          <a:fontRef idx="minor">
+            <a:schemeClr val="lt1"/>
+          </a:fontRef>
+        </p:style>
+        <p:txBody>
+          <a:bodyPr rtlCol="0" anchor="ctr"/>
+          <a:lstStyle/>
+          <a:p>
+            <a:pPr algn="ctr"/>
+            <a:endParaRPr lang="en-CA"/>
+          </a:p>
+        </p:txBody>
+      </p:sp>
+      <p:sp>
+        <p:nvSpPr>
+          <p:cNvPr id="29" name="Rectangle 28"/>
+          <p:cNvSpPr/>
+          <p:nvPr/>
+        </p:nvSpPr>
+        <p:spPr>
+          <a:xfrm>
+            <a:off x="2084796" y="2055474"/>
+            <a:ext cx="110847" cy="111614"/>
+          </a:xfrm>
+          <a:prstGeom prst="rect">
+            <a:avLst/>
+          </a:prstGeom>
+          <a:solidFill>
+            <a:srgbClr val="FF0000"/>
+          </a:solidFill>
+          <a:ln>
+            <a:solidFill>
+              <a:schemeClr val="tx1"/>
+            </a:solidFill>
+          </a:ln>
+        </p:spPr>
+        <p:style>
+          <a:lnRef idx="2">
+            <a:schemeClr val="accent1">
+              <a:shade val="50000"/>
+            </a:schemeClr>
+          </a:lnRef>
+          <a:fillRef idx="1">
+            <a:schemeClr val="accent1"/>
+          </a:fillRef>
+          <a:effectRef idx="0">
+            <a:schemeClr val="accent1"/>
+          </a:effectRef>
+          <a:fontRef idx="minor">
+            <a:schemeClr val="lt1"/>
+          </a:fontRef>
+        </p:style>
+        <p:txBody>
+          <a:bodyPr rtlCol="0" anchor="ctr"/>
+          <a:lstStyle/>
+          <a:p>
+            <a:pPr algn="ctr"/>
+            <a:endParaRPr lang="en-CA"/>
+          </a:p>
+        </p:txBody>
+      </p:sp>
+      <p:sp>
+        <p:nvSpPr>
+          <p:cNvPr id="30" name="Rectangle 29"/>
+          <p:cNvSpPr/>
+          <p:nvPr/>
+        </p:nvSpPr>
+        <p:spPr>
+          <a:xfrm>
+            <a:off x="1875498" y="2565547"/>
+            <a:ext cx="110847" cy="111614"/>
+          </a:xfrm>
+          <a:prstGeom prst="rect">
+            <a:avLst/>
+          </a:prstGeom>
+          <a:solidFill>
+            <a:srgbClr val="FF0000"/>
+          </a:solidFill>
+          <a:ln>
+            <a:solidFill>
+              <a:schemeClr val="tx1"/>
+            </a:solidFill>
+          </a:ln>
+        </p:spPr>
+        <p:style>
+          <a:lnRef idx="2">
+            <a:schemeClr val="accent1">
+              <a:shade val="50000"/>
+            </a:schemeClr>
+          </a:lnRef>
+          <a:fillRef idx="1">
+            <a:schemeClr val="accent1"/>
+          </a:fillRef>
+          <a:effectRef idx="0">
+            <a:schemeClr val="accent1"/>
+          </a:effectRef>
+          <a:fontRef idx="minor">
+            <a:schemeClr val="lt1"/>
+          </a:fontRef>
+        </p:style>
+        <p:txBody>
+          <a:bodyPr rtlCol="0" anchor="ctr"/>
+          <a:lstStyle/>
+          <a:p>
+            <a:pPr algn="ctr"/>
+            <a:endParaRPr lang="en-CA"/>
+          </a:p>
+        </p:txBody>
+      </p:sp>
+      <p:sp>
+        <p:nvSpPr>
+          <p:cNvPr id="31" name="Rectangle 30"/>
+          <p:cNvSpPr/>
+          <p:nvPr/>
+        </p:nvSpPr>
+        <p:spPr>
+          <a:xfrm>
+            <a:off x="1875496" y="2909714"/>
+            <a:ext cx="110847" cy="111614"/>
+          </a:xfrm>
+          <a:prstGeom prst="rect">
+            <a:avLst/>
+          </a:prstGeom>
+          <a:solidFill>
+            <a:srgbClr val="FF0000"/>
+          </a:solidFill>
+          <a:ln>
+            <a:solidFill>
+              <a:schemeClr val="tx1"/>
+            </a:solidFill>
+          </a:ln>
+        </p:spPr>
+        <p:style>
+          <a:lnRef idx="2">
+            <a:schemeClr val="accent1">
+              <a:shade val="50000"/>
+            </a:schemeClr>
+          </a:lnRef>
+          <a:fillRef idx="1">
+            <a:schemeClr val="accent1"/>
+          </a:fillRef>
+          <a:effectRef idx="0">
+            <a:schemeClr val="accent1"/>
+          </a:effectRef>
+          <a:fontRef idx="minor">
+            <a:schemeClr val="lt1"/>
+          </a:fontRef>
+        </p:style>
+        <p:txBody>
+          <a:bodyPr rtlCol="0" anchor="ctr"/>
+          <a:lstStyle/>
+          <a:p>
+            <a:pPr algn="ctr"/>
+            <a:endParaRPr lang="en-CA"/>
+          </a:p>
+        </p:txBody>
+      </p:sp>
+      <p:sp>
+        <p:nvSpPr>
+          <p:cNvPr id="32" name="Rectangle 31"/>
+          <p:cNvSpPr/>
+          <p:nvPr/>
+        </p:nvSpPr>
+        <p:spPr>
+          <a:xfrm>
+            <a:off x="1875497" y="2728638"/>
+            <a:ext cx="110847" cy="111614"/>
+          </a:xfrm>
+          <a:prstGeom prst="rect">
+            <a:avLst/>
+          </a:prstGeom>
+          <a:solidFill>
+            <a:srgbClr val="FF0000"/>
+          </a:solidFill>
+          <a:ln>
+            <a:solidFill>
+              <a:schemeClr val="tx1"/>
+            </a:solidFill>
+          </a:ln>
+        </p:spPr>
+        <p:style>
+          <a:lnRef idx="2">
+            <a:schemeClr val="accent1">
+              <a:shade val="50000"/>
+            </a:schemeClr>
+          </a:lnRef>
+          <a:fillRef idx="1">
+            <a:schemeClr val="accent1"/>
+          </a:fillRef>
+          <a:effectRef idx="0">
+            <a:schemeClr val="accent1"/>
+          </a:effectRef>
+          <a:fontRef idx="minor">
+            <a:schemeClr val="lt1"/>
+          </a:fontRef>
+        </p:style>
+        <p:txBody>
+          <a:bodyPr rtlCol="0" anchor="ctr"/>
+          <a:lstStyle/>
+          <a:p>
+            <a:pPr algn="ctr"/>
+            <a:endParaRPr lang="en-CA"/>
+          </a:p>
+        </p:txBody>
+      </p:sp>
+      <p:sp>
+        <p:nvSpPr>
+          <p:cNvPr id="33" name="Rectangle 32"/>
+          <p:cNvSpPr/>
+          <p:nvPr/>
+        </p:nvSpPr>
+        <p:spPr>
+          <a:xfrm>
+            <a:off x="2055042" y="2730329"/>
+            <a:ext cx="110847" cy="111614"/>
+          </a:xfrm>
+          <a:prstGeom prst="rect">
+            <a:avLst/>
+          </a:prstGeom>
+          <a:solidFill>
+            <a:srgbClr val="FF0000"/>
+          </a:solidFill>
+          <a:ln>
+            <a:solidFill>
+              <a:schemeClr val="tx1"/>
+            </a:solidFill>
+          </a:ln>
+        </p:spPr>
+        <p:style>
+          <a:lnRef idx="2">
+            <a:schemeClr val="accent1">
+              <a:shade val="50000"/>
+            </a:schemeClr>
+          </a:lnRef>
+          <a:fillRef idx="1">
+            <a:schemeClr val="accent1"/>
+          </a:fillRef>
+          <a:effectRef idx="0">
+            <a:schemeClr val="accent1"/>
+          </a:effectRef>
+          <a:fontRef idx="minor">
+            <a:schemeClr val="lt1"/>
+          </a:fontRef>
+        </p:style>
+        <p:txBody>
+          <a:bodyPr rtlCol="0" anchor="ctr"/>
+          <a:lstStyle/>
+          <a:p>
+            <a:pPr algn="ctr"/>
+            <a:endParaRPr lang="en-CA"/>
+          </a:p>
+        </p:txBody>
+      </p:sp>
+      <p:sp>
+        <p:nvSpPr>
+          <p:cNvPr id="34" name="Rectangle 33"/>
+          <p:cNvSpPr/>
+          <p:nvPr/>
+        </p:nvSpPr>
+        <p:spPr>
+          <a:xfrm>
+            <a:off x="2267686" y="2909855"/>
+            <a:ext cx="110847" cy="111614"/>
+          </a:xfrm>
+          <a:prstGeom prst="rect">
+            <a:avLst/>
+          </a:prstGeom>
+          <a:solidFill>
+            <a:srgbClr val="FF0000"/>
+          </a:solidFill>
+          <a:ln>
+            <a:solidFill>
+              <a:schemeClr val="tx1"/>
+            </a:solidFill>
+          </a:ln>
+        </p:spPr>
+        <p:style>
+          <a:lnRef idx="2">
+            <a:schemeClr val="accent1">
+              <a:shade val="50000"/>
+            </a:schemeClr>
+          </a:lnRef>
+          <a:fillRef idx="1">
+            <a:schemeClr val="accent1"/>
+          </a:fillRef>
+          <a:effectRef idx="0">
+            <a:schemeClr val="accent1"/>
+          </a:effectRef>
+          <a:fontRef idx="minor">
+            <a:schemeClr val="lt1"/>
+          </a:fontRef>
+        </p:style>
+        <p:txBody>
+          <a:bodyPr rtlCol="0" anchor="ctr"/>
+          <a:lstStyle/>
+          <a:p>
+            <a:pPr algn="ctr"/>
+            <a:endParaRPr lang="en-CA"/>
+          </a:p>
+        </p:txBody>
+      </p:sp>
+      <p:sp>
+        <p:nvSpPr>
+          <p:cNvPr id="35" name="Rectangle 34"/>
+          <p:cNvSpPr/>
+          <p:nvPr/>
+        </p:nvSpPr>
+        <p:spPr>
+          <a:xfrm>
+            <a:off x="2055042" y="2902567"/>
+            <a:ext cx="110847" cy="111614"/>
+          </a:xfrm>
+          <a:prstGeom prst="rect">
+            <a:avLst/>
+          </a:prstGeom>
+          <a:solidFill>
+            <a:srgbClr val="FF0000"/>
+          </a:solidFill>
+          <a:ln>
+            <a:solidFill>
+              <a:schemeClr val="tx1"/>
+            </a:solidFill>
+          </a:ln>
+        </p:spPr>
+        <p:style>
+          <a:lnRef idx="2">
+            <a:schemeClr val="accent1">
+              <a:shade val="50000"/>
+            </a:schemeClr>
+          </a:lnRef>
+          <a:fillRef idx="1">
+            <a:schemeClr val="accent1"/>
+          </a:fillRef>
+          <a:effectRef idx="0">
+            <a:schemeClr val="accent1"/>
+          </a:effectRef>
+          <a:fontRef idx="minor">
+            <a:schemeClr val="lt1"/>
+          </a:fontRef>
+        </p:style>
+        <p:txBody>
+          <a:bodyPr rtlCol="0" anchor="ctr"/>
+          <a:lstStyle/>
+          <a:p>
+            <a:pPr algn="ctr"/>
+            <a:endParaRPr lang="en-CA"/>
+          </a:p>
+        </p:txBody>
+      </p:sp>
+      <p:sp>
+        <p:nvSpPr>
+          <p:cNvPr id="36" name="Rectangle 35"/>
+          <p:cNvSpPr/>
+          <p:nvPr/>
+        </p:nvSpPr>
+        <p:spPr>
+          <a:xfrm>
+            <a:off x="1891164" y="3413950"/>
+            <a:ext cx="110847" cy="111614"/>
+          </a:xfrm>
+          <a:prstGeom prst="rect">
+            <a:avLst/>
+          </a:prstGeom>
+          <a:solidFill>
+            <a:srgbClr val="FF0000"/>
+          </a:solidFill>
+          <a:ln>
+            <a:solidFill>
+              <a:schemeClr val="tx1"/>
+            </a:solidFill>
+          </a:ln>
+        </p:spPr>
+        <p:style>
+          <a:lnRef idx="2">
+            <a:schemeClr val="accent1">
+              <a:shade val="50000"/>
+            </a:schemeClr>
+          </a:lnRef>
+          <a:fillRef idx="1">
+            <a:schemeClr val="accent1"/>
+          </a:fillRef>
+          <a:effectRef idx="0">
+            <a:schemeClr val="accent1"/>
+          </a:effectRef>
+          <a:fontRef idx="minor">
+            <a:schemeClr val="lt1"/>
+          </a:fontRef>
+        </p:style>
+        <p:txBody>
+          <a:bodyPr rtlCol="0" anchor="ctr"/>
+          <a:lstStyle/>
+          <a:p>
+            <a:pPr algn="ctr"/>
+            <a:endParaRPr lang="en-CA"/>
+          </a:p>
+        </p:txBody>
+      </p:sp>
+      <p:sp>
+        <p:nvSpPr>
+          <p:cNvPr id="37" name="Rectangle 36"/>
+          <p:cNvSpPr/>
+          <p:nvPr/>
+        </p:nvSpPr>
+        <p:spPr>
+          <a:xfrm>
+            <a:off x="1891162" y="3758117"/>
+            <a:ext cx="110847" cy="111614"/>
+          </a:xfrm>
+          <a:prstGeom prst="rect">
+            <a:avLst/>
+          </a:prstGeom>
+          <a:solidFill>
+            <a:srgbClr val="FF0000"/>
+          </a:solidFill>
+          <a:ln>
+            <a:solidFill>
+              <a:schemeClr val="tx1"/>
+            </a:solidFill>
+          </a:ln>
+        </p:spPr>
+        <p:style>
+          <a:lnRef idx="2">
+            <a:schemeClr val="accent1">
+              <a:shade val="50000"/>
+            </a:schemeClr>
+          </a:lnRef>
+          <a:fillRef idx="1">
+            <a:schemeClr val="accent1"/>
+          </a:fillRef>
+          <a:effectRef idx="0">
+            <a:schemeClr val="accent1"/>
+          </a:effectRef>
+          <a:fontRef idx="minor">
+            <a:schemeClr val="lt1"/>
+          </a:fontRef>
+        </p:style>
+        <p:txBody>
+          <a:bodyPr rtlCol="0" anchor="ctr"/>
+          <a:lstStyle/>
+          <a:p>
+            <a:pPr algn="ctr"/>
+            <a:endParaRPr lang="en-CA"/>
+          </a:p>
+        </p:txBody>
+      </p:sp>
+      <p:sp>
+        <p:nvSpPr>
+          <p:cNvPr id="38" name="Rectangle 37"/>
+          <p:cNvSpPr/>
+          <p:nvPr/>
+        </p:nvSpPr>
+        <p:spPr>
+          <a:xfrm>
+            <a:off x="1891163" y="3577041"/>
+            <a:ext cx="110847" cy="111614"/>
+          </a:xfrm>
+          <a:prstGeom prst="rect">
+            <a:avLst/>
+          </a:prstGeom>
+          <a:solidFill>
+            <a:srgbClr val="FF0000"/>
+          </a:solidFill>
+          <a:ln>
+            <a:solidFill>
+              <a:schemeClr val="tx1"/>
+            </a:solidFill>
+          </a:ln>
+        </p:spPr>
+        <p:style>
+          <a:lnRef idx="2">
+            <a:schemeClr val="accent1">
+              <a:shade val="50000"/>
+            </a:schemeClr>
+          </a:lnRef>
+          <a:fillRef idx="1">
+            <a:schemeClr val="accent1"/>
+          </a:fillRef>
+          <a:effectRef idx="0">
+            <a:schemeClr val="accent1"/>
+          </a:effectRef>
+          <a:fontRef idx="minor">
+            <a:schemeClr val="lt1"/>
+          </a:fontRef>
+        </p:style>
+        <p:txBody>
+          <a:bodyPr rtlCol="0" anchor="ctr"/>
+          <a:lstStyle/>
+          <a:p>
+            <a:pPr algn="ctr"/>
+            <a:endParaRPr lang="en-CA"/>
+          </a:p>
+        </p:txBody>
+      </p:sp>
+      <p:sp>
+        <p:nvSpPr>
+          <p:cNvPr id="39" name="Rectangle 38"/>
+          <p:cNvSpPr/>
+          <p:nvPr/>
+        </p:nvSpPr>
+        <p:spPr>
+          <a:xfrm>
+            <a:off x="2070708" y="3578732"/>
+            <a:ext cx="110847" cy="111614"/>
+          </a:xfrm>
+          <a:prstGeom prst="rect">
+            <a:avLst/>
+          </a:prstGeom>
+          <a:solidFill>
+            <a:srgbClr val="FF0000"/>
+          </a:solidFill>
+          <a:ln>
+            <a:solidFill>
+              <a:schemeClr val="tx1"/>
+            </a:solidFill>
+          </a:ln>
+        </p:spPr>
+        <p:style>
+          <a:lnRef idx="2">
+            <a:schemeClr val="accent1">
+              <a:shade val="50000"/>
+            </a:schemeClr>
+          </a:lnRef>
+          <a:fillRef idx="1">
+            <a:schemeClr val="accent1"/>
+          </a:fillRef>
+          <a:effectRef idx="0">
+            <a:schemeClr val="accent1"/>
+          </a:effectRef>
+          <a:fontRef idx="minor">
+            <a:schemeClr val="lt1"/>
+          </a:fontRef>
+        </p:style>
+        <p:txBody>
+          <a:bodyPr rtlCol="0" anchor="ctr"/>
+          <a:lstStyle/>
+          <a:p>
+            <a:pPr algn="ctr"/>
+            <a:endParaRPr lang="en-CA"/>
+          </a:p>
+        </p:txBody>
+      </p:sp>
+      <p:sp>
+        <p:nvSpPr>
+          <p:cNvPr id="40" name="Rectangle 39"/>
+          <p:cNvSpPr/>
+          <p:nvPr/>
+        </p:nvSpPr>
+        <p:spPr>
+          <a:xfrm>
+            <a:off x="2283352" y="3758258"/>
+            <a:ext cx="110847" cy="111614"/>
+          </a:xfrm>
+          <a:prstGeom prst="rect">
+            <a:avLst/>
+          </a:prstGeom>
+          <a:solidFill>
+            <a:srgbClr val="FF0000"/>
+          </a:solidFill>
+          <a:ln>
+            <a:solidFill>
+              <a:schemeClr val="tx1"/>
+            </a:solidFill>
+          </a:ln>
+        </p:spPr>
+        <p:style>
+          <a:lnRef idx="2">
+            <a:schemeClr val="accent1">
+              <a:shade val="50000"/>
+            </a:schemeClr>
+          </a:lnRef>
+          <a:fillRef idx="1">
+            <a:schemeClr val="accent1"/>
+          </a:fillRef>
+          <a:effectRef idx="0">
+            <a:schemeClr val="accent1"/>
+          </a:effectRef>
+          <a:fontRef idx="minor">
+            <a:schemeClr val="lt1"/>
+          </a:fontRef>
+        </p:style>
+        <p:txBody>
+          <a:bodyPr rtlCol="0" anchor="ctr"/>
+          <a:lstStyle/>
+          <a:p>
+            <a:pPr algn="ctr"/>
+            <a:endParaRPr lang="en-CA"/>
+          </a:p>
+        </p:txBody>
+      </p:sp>
+      <p:sp>
+        <p:nvSpPr>
+          <p:cNvPr id="41" name="Rectangle 40"/>
+          <p:cNvSpPr/>
+          <p:nvPr/>
+        </p:nvSpPr>
+        <p:spPr>
+          <a:xfrm>
+            <a:off x="2070708" y="3750970"/>
+            <a:ext cx="110847" cy="111614"/>
+          </a:xfrm>
+          <a:prstGeom prst="rect">
+            <a:avLst/>
+          </a:prstGeom>
+          <a:solidFill>
+            <a:srgbClr val="FF0000"/>
+          </a:solidFill>
+          <a:ln>
+            <a:solidFill>
+              <a:schemeClr val="tx1"/>
+            </a:solidFill>
+          </a:ln>
+        </p:spPr>
+        <p:style>
+          <a:lnRef idx="2">
+            <a:schemeClr val="accent1">
+              <a:shade val="50000"/>
+            </a:schemeClr>
+          </a:lnRef>
+          <a:fillRef idx="1">
+            <a:schemeClr val="accent1"/>
+          </a:fillRef>
+          <a:effectRef idx="0">
+            <a:schemeClr val="accent1"/>
+          </a:effectRef>
+          <a:fontRef idx="minor">
+            <a:schemeClr val="lt1"/>
+          </a:fontRef>
+        </p:style>
+        <p:txBody>
+          <a:bodyPr rtlCol="0" anchor="ctr"/>
+          <a:lstStyle/>
+          <a:p>
+            <a:pPr algn="ctr"/>
+            <a:endParaRPr lang="en-CA"/>
+          </a:p>
+        </p:txBody>
+      </p:sp>
+      <p:sp>
+        <p:nvSpPr>
+          <p:cNvPr id="42" name="Rectangle 41"/>
+          <p:cNvSpPr/>
+          <p:nvPr/>
+        </p:nvSpPr>
+        <p:spPr>
+          <a:xfrm>
+            <a:off x="9310884" y="1718454"/>
+            <a:ext cx="110847" cy="111614"/>
+          </a:xfrm>
+          <a:prstGeom prst="rect">
+            <a:avLst/>
+          </a:prstGeom>
+          <a:solidFill>
+            <a:srgbClr val="FF0000"/>
+          </a:solidFill>
+          <a:ln>
+            <a:solidFill>
+              <a:schemeClr val="tx1"/>
+            </a:solidFill>
+          </a:ln>
+        </p:spPr>
+        <p:style>
+          <a:lnRef idx="2">
+            <a:schemeClr val="accent1">
+              <a:shade val="50000"/>
+            </a:schemeClr>
+          </a:lnRef>
+          <a:fillRef idx="1">
+            <a:schemeClr val="accent1"/>
+          </a:fillRef>
+          <a:effectRef idx="0">
+            <a:schemeClr val="accent1"/>
+          </a:effectRef>
+          <a:fontRef idx="minor">
+            <a:schemeClr val="lt1"/>
+          </a:fontRef>
+        </p:style>
+        <p:txBody>
+          <a:bodyPr rtlCol="0" anchor="ctr"/>
+          <a:lstStyle/>
+          <a:p>
+            <a:pPr algn="ctr"/>
+            <a:endParaRPr lang="en-CA"/>
+          </a:p>
+        </p:txBody>
+      </p:sp>
+      <p:sp>
+        <p:nvSpPr>
+          <p:cNvPr id="43" name="Rectangle 42"/>
+          <p:cNvSpPr/>
+          <p:nvPr/>
+        </p:nvSpPr>
+        <p:spPr>
+          <a:xfrm>
+            <a:off x="9310882" y="2062621"/>
+            <a:ext cx="110847" cy="111614"/>
+          </a:xfrm>
+          <a:prstGeom prst="rect">
+            <a:avLst/>
+          </a:prstGeom>
+          <a:solidFill>
+            <a:srgbClr val="FF0000"/>
+          </a:solidFill>
+          <a:ln>
+            <a:solidFill>
+              <a:schemeClr val="tx1"/>
+            </a:solidFill>
+          </a:ln>
+        </p:spPr>
+        <p:style>
+          <a:lnRef idx="2">
+            <a:schemeClr val="accent1">
+              <a:shade val="50000"/>
+            </a:schemeClr>
+          </a:lnRef>
+          <a:fillRef idx="1">
+            <a:schemeClr val="accent1"/>
+          </a:fillRef>
+          <a:effectRef idx="0">
+            <a:schemeClr val="accent1"/>
+          </a:effectRef>
+          <a:fontRef idx="minor">
+            <a:schemeClr val="lt1"/>
+          </a:fontRef>
+        </p:style>
+        <p:txBody>
+          <a:bodyPr rtlCol="0" anchor="ctr"/>
+          <a:lstStyle/>
+          <a:p>
+            <a:pPr algn="ctr"/>
+            <a:endParaRPr lang="en-CA"/>
+          </a:p>
+        </p:txBody>
+      </p:sp>
+      <p:sp>
+        <p:nvSpPr>
+          <p:cNvPr id="44" name="Rectangle 43"/>
+          <p:cNvSpPr/>
+          <p:nvPr/>
+        </p:nvSpPr>
+        <p:spPr>
+          <a:xfrm>
+            <a:off x="9310883" y="1881545"/>
+            <a:ext cx="110847" cy="111614"/>
+          </a:xfrm>
+          <a:prstGeom prst="rect">
+            <a:avLst/>
+          </a:prstGeom>
+          <a:solidFill>
+            <a:srgbClr val="FF0000"/>
+          </a:solidFill>
+          <a:ln>
+            <a:solidFill>
+              <a:schemeClr val="tx1"/>
+            </a:solidFill>
+          </a:ln>
+        </p:spPr>
+        <p:style>
+          <a:lnRef idx="2">
+            <a:schemeClr val="accent1">
+              <a:shade val="50000"/>
+            </a:schemeClr>
+          </a:lnRef>
+          <a:fillRef idx="1">
+            <a:schemeClr val="accent1"/>
+          </a:fillRef>
+          <a:effectRef idx="0">
+            <a:schemeClr val="accent1"/>
+          </a:effectRef>
+          <a:fontRef idx="minor">
+            <a:schemeClr val="lt1"/>
+          </a:fontRef>
+        </p:style>
+        <p:txBody>
+          <a:bodyPr rtlCol="0" anchor="ctr"/>
+          <a:lstStyle/>
+          <a:p>
+            <a:pPr algn="ctr"/>
+            <a:endParaRPr lang="en-CA"/>
+          </a:p>
+        </p:txBody>
+      </p:sp>
+      <p:sp>
+        <p:nvSpPr>
+          <p:cNvPr id="45" name="Rectangle 44"/>
+          <p:cNvSpPr/>
+          <p:nvPr/>
+        </p:nvSpPr>
+        <p:spPr>
+          <a:xfrm>
+            <a:off x="9490428" y="1883236"/>
+            <a:ext cx="110847" cy="111614"/>
+          </a:xfrm>
+          <a:prstGeom prst="rect">
+            <a:avLst/>
+          </a:prstGeom>
+          <a:solidFill>
+            <a:srgbClr val="FF0000"/>
+          </a:solidFill>
+          <a:ln>
+            <a:solidFill>
+              <a:schemeClr val="tx1"/>
+            </a:solidFill>
+          </a:ln>
+        </p:spPr>
+        <p:style>
+          <a:lnRef idx="2">
+            <a:schemeClr val="accent1">
+              <a:shade val="50000"/>
+            </a:schemeClr>
+          </a:lnRef>
+          <a:fillRef idx="1">
+            <a:schemeClr val="accent1"/>
+          </a:fillRef>
+          <a:effectRef idx="0">
+            <a:schemeClr val="accent1"/>
+          </a:effectRef>
+          <a:fontRef idx="minor">
+            <a:schemeClr val="lt1"/>
+          </a:fontRef>
+        </p:style>
+        <p:txBody>
+          <a:bodyPr rtlCol="0" anchor="ctr"/>
+          <a:lstStyle/>
+          <a:p>
+            <a:pPr algn="ctr"/>
+            <a:endParaRPr lang="en-CA"/>
+          </a:p>
+        </p:txBody>
+      </p:sp>
+      <p:sp>
+        <p:nvSpPr>
+          <p:cNvPr id="46" name="Rectangle 45"/>
+          <p:cNvSpPr/>
+          <p:nvPr/>
+        </p:nvSpPr>
+        <p:spPr>
+          <a:xfrm>
+            <a:off x="9703072" y="2062762"/>
+            <a:ext cx="110847" cy="111614"/>
+          </a:xfrm>
+          <a:prstGeom prst="rect">
+            <a:avLst/>
+          </a:prstGeom>
+          <a:solidFill>
+            <a:srgbClr val="FF0000"/>
+          </a:solidFill>
+          <a:ln>
+            <a:solidFill>
+              <a:schemeClr val="tx1"/>
+            </a:solidFill>
+          </a:ln>
+        </p:spPr>
+        <p:style>
+          <a:lnRef idx="2">
+            <a:schemeClr val="accent1">
+              <a:shade val="50000"/>
+            </a:schemeClr>
+          </a:lnRef>
+          <a:fillRef idx="1">
+            <a:schemeClr val="accent1"/>
+          </a:fillRef>
+          <a:effectRef idx="0">
+            <a:schemeClr val="accent1"/>
+          </a:effectRef>
+          <a:fontRef idx="minor">
+            <a:schemeClr val="lt1"/>
+          </a:fontRef>
+        </p:style>
+        <p:txBody>
+          <a:bodyPr rtlCol="0" anchor="ctr"/>
+          <a:lstStyle/>
+          <a:p>
+            <a:pPr algn="ctr"/>
+            <a:endParaRPr lang="en-CA"/>
+          </a:p>
+        </p:txBody>
+      </p:sp>
+      <p:sp>
+        <p:nvSpPr>
+          <p:cNvPr id="47" name="Rectangle 46"/>
+          <p:cNvSpPr/>
+          <p:nvPr/>
+        </p:nvSpPr>
+        <p:spPr>
+          <a:xfrm>
+            <a:off x="9490428" y="2055474"/>
+            <a:ext cx="110847" cy="111614"/>
+          </a:xfrm>
+          <a:prstGeom prst="rect">
+            <a:avLst/>
+          </a:prstGeom>
+          <a:solidFill>
+            <a:srgbClr val="FF0000"/>
+          </a:solidFill>
+          <a:ln>
+            <a:solidFill>
+              <a:schemeClr val="tx1"/>
+            </a:solidFill>
+          </a:ln>
+        </p:spPr>
+        <p:style>
+          <a:lnRef idx="2">
+            <a:schemeClr val="accent1">
+              <a:shade val="50000"/>
+            </a:schemeClr>
+          </a:lnRef>
+          <a:fillRef idx="1">
+            <a:schemeClr val="accent1"/>
+          </a:fillRef>
+          <a:effectRef idx="0">
+            <a:schemeClr val="accent1"/>
+          </a:effectRef>
+          <a:fontRef idx="minor">
+            <a:schemeClr val="lt1"/>
+          </a:fontRef>
+        </p:style>
+        <p:txBody>
+          <a:bodyPr rtlCol="0" anchor="ctr"/>
+          <a:lstStyle/>
+          <a:p>
+            <a:pPr algn="ctr"/>
+            <a:endParaRPr lang="en-CA"/>
+          </a:p>
+        </p:txBody>
+      </p:sp>
+      <p:sp>
+        <p:nvSpPr>
+          <p:cNvPr id="48" name="Rectangle 47"/>
+          <p:cNvSpPr/>
+          <p:nvPr/>
+        </p:nvSpPr>
+        <p:spPr>
+          <a:xfrm>
+            <a:off x="9295454" y="2657142"/>
+            <a:ext cx="110847" cy="111614"/>
+          </a:xfrm>
+          <a:prstGeom prst="rect">
+            <a:avLst/>
+          </a:prstGeom>
+          <a:solidFill>
+            <a:srgbClr val="FF0000"/>
+          </a:solidFill>
+          <a:ln>
+            <a:solidFill>
+              <a:schemeClr val="tx1"/>
+            </a:solidFill>
+          </a:ln>
+        </p:spPr>
+        <p:style>
+          <a:lnRef idx="2">
+            <a:schemeClr val="accent1">
+              <a:shade val="50000"/>
+            </a:schemeClr>
+          </a:lnRef>
+          <a:fillRef idx="1">
+            <a:schemeClr val="accent1"/>
+          </a:fillRef>
+          <a:effectRef idx="0">
+            <a:schemeClr val="accent1"/>
+          </a:effectRef>
+          <a:fontRef idx="minor">
+            <a:schemeClr val="lt1"/>
+          </a:fontRef>
+        </p:style>
+        <p:txBody>
+          <a:bodyPr rtlCol="0" anchor="ctr"/>
+          <a:lstStyle/>
+          <a:p>
+            <a:pPr algn="ctr"/>
+            <a:endParaRPr lang="en-CA"/>
+          </a:p>
+        </p:txBody>
+      </p:sp>
+      <p:sp>
+        <p:nvSpPr>
+          <p:cNvPr id="49" name="Rectangle 48"/>
+          <p:cNvSpPr/>
+          <p:nvPr/>
+        </p:nvSpPr>
+        <p:spPr>
+          <a:xfrm>
+            <a:off x="9295452" y="3001309"/>
+            <a:ext cx="110847" cy="111614"/>
+          </a:xfrm>
+          <a:prstGeom prst="rect">
+            <a:avLst/>
+          </a:prstGeom>
+          <a:solidFill>
+            <a:srgbClr val="FF0000"/>
+          </a:solidFill>
+          <a:ln>
+            <a:solidFill>
+              <a:schemeClr val="tx1"/>
+            </a:solidFill>
+          </a:ln>
+        </p:spPr>
+        <p:style>
+          <a:lnRef idx="2">
+            <a:schemeClr val="accent1">
+              <a:shade val="50000"/>
+            </a:schemeClr>
+          </a:lnRef>
+          <a:fillRef idx="1">
+            <a:schemeClr val="accent1"/>
+          </a:fillRef>
+          <a:effectRef idx="0">
+            <a:schemeClr val="accent1"/>
+          </a:effectRef>
+          <a:fontRef idx="minor">
+            <a:schemeClr val="lt1"/>
+          </a:fontRef>
+        </p:style>
+        <p:txBody>
+          <a:bodyPr rtlCol="0" anchor="ctr"/>
+          <a:lstStyle/>
+          <a:p>
+            <a:pPr algn="ctr"/>
+            <a:endParaRPr lang="en-CA"/>
+          </a:p>
+        </p:txBody>
+      </p:sp>
+      <p:sp>
+        <p:nvSpPr>
+          <p:cNvPr id="50" name="Rectangle 49"/>
+          <p:cNvSpPr/>
+          <p:nvPr/>
+        </p:nvSpPr>
+        <p:spPr>
+          <a:xfrm>
+            <a:off x="9295453" y="2820233"/>
+            <a:ext cx="110847" cy="111614"/>
+          </a:xfrm>
+          <a:prstGeom prst="rect">
+            <a:avLst/>
+          </a:prstGeom>
+          <a:solidFill>
+            <a:srgbClr val="FF0000"/>
+          </a:solidFill>
+          <a:ln>
+            <a:solidFill>
+              <a:schemeClr val="tx1"/>
+            </a:solidFill>
+          </a:ln>
+        </p:spPr>
+        <p:style>
+          <a:lnRef idx="2">
+            <a:schemeClr val="accent1">
+              <a:shade val="50000"/>
+            </a:schemeClr>
+          </a:lnRef>
+          <a:fillRef idx="1">
+            <a:schemeClr val="accent1"/>
+          </a:fillRef>
+          <a:effectRef idx="0">
+            <a:schemeClr val="accent1"/>
+          </a:effectRef>
+          <a:fontRef idx="minor">
+            <a:schemeClr val="lt1"/>
+          </a:fontRef>
+        </p:style>
+        <p:txBody>
+          <a:bodyPr rtlCol="0" anchor="ctr"/>
+          <a:lstStyle/>
+          <a:p>
+            <a:pPr algn="ctr"/>
+            <a:endParaRPr lang="en-CA"/>
+          </a:p>
+        </p:txBody>
+      </p:sp>
+      <p:sp>
+        <p:nvSpPr>
+          <p:cNvPr id="51" name="Rectangle 50"/>
+          <p:cNvSpPr/>
+          <p:nvPr/>
+        </p:nvSpPr>
+        <p:spPr>
+          <a:xfrm>
+            <a:off x="9474998" y="2821924"/>
+            <a:ext cx="110847" cy="111614"/>
+          </a:xfrm>
+          <a:prstGeom prst="rect">
+            <a:avLst/>
+          </a:prstGeom>
+          <a:solidFill>
+            <a:srgbClr val="FF0000"/>
+          </a:solidFill>
+          <a:ln>
+            <a:solidFill>
+              <a:schemeClr val="tx1"/>
+            </a:solidFill>
+          </a:ln>
+        </p:spPr>
+        <p:style>
+          <a:lnRef idx="2">
+            <a:schemeClr val="accent1">
+              <a:shade val="50000"/>
+            </a:schemeClr>
+          </a:lnRef>
+          <a:fillRef idx="1">
+            <a:schemeClr val="accent1"/>
+          </a:fillRef>
+          <a:effectRef idx="0">
+            <a:schemeClr val="accent1"/>
+          </a:effectRef>
+          <a:fontRef idx="minor">
+            <a:schemeClr val="lt1"/>
+          </a:fontRef>
+        </p:style>
+        <p:txBody>
+          <a:bodyPr rtlCol="0" anchor="ctr"/>
+          <a:lstStyle/>
+          <a:p>
+            <a:pPr algn="ctr"/>
+            <a:endParaRPr lang="en-CA"/>
+          </a:p>
+        </p:txBody>
+      </p:sp>
+      <p:sp>
+        <p:nvSpPr>
+          <p:cNvPr id="52" name="Rectangle 51"/>
+          <p:cNvSpPr/>
+          <p:nvPr/>
+        </p:nvSpPr>
+        <p:spPr>
+          <a:xfrm>
+            <a:off x="9687642" y="3001450"/>
+            <a:ext cx="110847" cy="111614"/>
+          </a:xfrm>
+          <a:prstGeom prst="rect">
+            <a:avLst/>
+          </a:prstGeom>
+          <a:solidFill>
+            <a:srgbClr val="FF0000"/>
+          </a:solidFill>
+          <a:ln>
+            <a:solidFill>
+              <a:schemeClr val="tx1"/>
+            </a:solidFill>
+          </a:ln>
+        </p:spPr>
+        <p:style>
+          <a:lnRef idx="2">
+            <a:schemeClr val="accent1">
+              <a:shade val="50000"/>
+            </a:schemeClr>
+          </a:lnRef>
+          <a:fillRef idx="1">
+            <a:schemeClr val="accent1"/>
+          </a:fillRef>
+          <a:effectRef idx="0">
+            <a:schemeClr val="accent1"/>
+          </a:effectRef>
+          <a:fontRef idx="minor">
+            <a:schemeClr val="lt1"/>
+          </a:fontRef>
+        </p:style>
+        <p:txBody>
+          <a:bodyPr rtlCol="0" anchor="ctr"/>
+          <a:lstStyle/>
+          <a:p>
+            <a:pPr algn="ctr"/>
+            <a:endParaRPr lang="en-CA"/>
+          </a:p>
+        </p:txBody>
+      </p:sp>
+      <p:sp>
+        <p:nvSpPr>
+          <p:cNvPr id="53" name="Rectangle 52"/>
+          <p:cNvSpPr/>
+          <p:nvPr/>
+        </p:nvSpPr>
+        <p:spPr>
+          <a:xfrm>
+            <a:off x="9474998" y="2994162"/>
+            <a:ext cx="110847" cy="111614"/>
+          </a:xfrm>
+          <a:prstGeom prst="rect">
+            <a:avLst/>
+          </a:prstGeom>
+          <a:solidFill>
+            <a:srgbClr val="FF0000"/>
+          </a:solidFill>
+          <a:ln>
+            <a:solidFill>
+              <a:schemeClr val="tx1"/>
+            </a:solidFill>
+          </a:ln>
+        </p:spPr>
+        <p:style>
+          <a:lnRef idx="2">
+            <a:schemeClr val="accent1">
+              <a:shade val="50000"/>
+            </a:schemeClr>
+          </a:lnRef>
+          <a:fillRef idx="1">
+            <a:schemeClr val="accent1"/>
+          </a:fillRef>
+          <a:effectRef idx="0">
+            <a:schemeClr val="accent1"/>
+          </a:effectRef>
+          <a:fontRef idx="minor">
+            <a:schemeClr val="lt1"/>
+          </a:fontRef>
+        </p:style>
+        <p:txBody>
+          <a:bodyPr rtlCol="0" anchor="ctr"/>
+          <a:lstStyle/>
+          <a:p>
+            <a:pPr algn="ctr"/>
+            <a:endParaRPr lang="en-CA"/>
+          </a:p>
+        </p:txBody>
+      </p:sp>
+      <p:sp>
+        <p:nvSpPr>
+          <p:cNvPr id="54" name="Rectangle 53"/>
+          <p:cNvSpPr/>
+          <p:nvPr/>
+        </p:nvSpPr>
+        <p:spPr>
+          <a:xfrm>
+            <a:off x="9294274" y="3604978"/>
+            <a:ext cx="110847" cy="111614"/>
+          </a:xfrm>
+          <a:prstGeom prst="rect">
+            <a:avLst/>
+          </a:prstGeom>
+          <a:solidFill>
+            <a:srgbClr val="FF0000"/>
+          </a:solidFill>
+          <a:ln>
+            <a:solidFill>
+              <a:schemeClr val="tx1"/>
+            </a:solidFill>
+          </a:ln>
+        </p:spPr>
+        <p:style>
+          <a:lnRef idx="2">
+            <a:schemeClr val="accent1">
+              <a:shade val="50000"/>
+            </a:schemeClr>
+          </a:lnRef>
+          <a:fillRef idx="1">
+            <a:schemeClr val="accent1"/>
+          </a:fillRef>
+          <a:effectRef idx="0">
+            <a:schemeClr val="accent1"/>
+          </a:effectRef>
+          <a:fontRef idx="minor">
+            <a:schemeClr val="lt1"/>
+          </a:fontRef>
+        </p:style>
+        <p:txBody>
+          <a:bodyPr rtlCol="0" anchor="ctr"/>
+          <a:lstStyle/>
+          <a:p>
+            <a:pPr algn="ctr"/>
+            <a:endParaRPr lang="en-CA"/>
+          </a:p>
+        </p:txBody>
+      </p:sp>
+      <p:sp>
+        <p:nvSpPr>
+          <p:cNvPr id="55" name="Rectangle 54"/>
+          <p:cNvSpPr/>
+          <p:nvPr/>
+        </p:nvSpPr>
+        <p:spPr>
+          <a:xfrm>
+            <a:off x="9294272" y="3949145"/>
+            <a:ext cx="110847" cy="111614"/>
+          </a:xfrm>
+          <a:prstGeom prst="rect">
+            <a:avLst/>
+          </a:prstGeom>
+          <a:solidFill>
+            <a:srgbClr val="FF0000"/>
+          </a:solidFill>
+          <a:ln>
+            <a:solidFill>
+              <a:schemeClr val="tx1"/>
+            </a:solidFill>
+          </a:ln>
+        </p:spPr>
+        <p:style>
+          <a:lnRef idx="2">
+            <a:schemeClr val="accent1">
+              <a:shade val="50000"/>
+            </a:schemeClr>
+          </a:lnRef>
+          <a:fillRef idx="1">
+            <a:schemeClr val="accent1"/>
+          </a:fillRef>
+          <a:effectRef idx="0">
+            <a:schemeClr val="accent1"/>
+          </a:effectRef>
+          <a:fontRef idx="minor">
+            <a:schemeClr val="lt1"/>
+          </a:fontRef>
+        </p:style>
+        <p:txBody>
+          <a:bodyPr rtlCol="0" anchor="ctr"/>
+          <a:lstStyle/>
+          <a:p>
+            <a:pPr algn="ctr"/>
+            <a:endParaRPr lang="en-CA"/>
+          </a:p>
+        </p:txBody>
+      </p:sp>
+      <p:sp>
+        <p:nvSpPr>
+          <p:cNvPr id="56" name="Rectangle 55"/>
+          <p:cNvSpPr/>
+          <p:nvPr/>
+        </p:nvSpPr>
+        <p:spPr>
+          <a:xfrm>
+            <a:off x="9294273" y="3768069"/>
+            <a:ext cx="110847" cy="111614"/>
+          </a:xfrm>
+          <a:prstGeom prst="rect">
+            <a:avLst/>
+          </a:prstGeom>
+          <a:solidFill>
+            <a:srgbClr val="FF0000"/>
+          </a:solidFill>
+          <a:ln>
+            <a:solidFill>
+              <a:schemeClr val="tx1"/>
+            </a:solidFill>
+          </a:ln>
+        </p:spPr>
+        <p:style>
+          <a:lnRef idx="2">
+            <a:schemeClr val="accent1">
+              <a:shade val="50000"/>
+            </a:schemeClr>
+          </a:lnRef>
+          <a:fillRef idx="1">
+            <a:schemeClr val="accent1"/>
+          </a:fillRef>
+          <a:effectRef idx="0">
+            <a:schemeClr val="accent1"/>
+          </a:effectRef>
+          <a:fontRef idx="minor">
+            <a:schemeClr val="lt1"/>
+          </a:fontRef>
+        </p:style>
+        <p:txBody>
+          <a:bodyPr rtlCol="0" anchor="ctr"/>
+          <a:lstStyle/>
+          <a:p>
+            <a:pPr algn="ctr"/>
+            <a:endParaRPr lang="en-CA"/>
+          </a:p>
+        </p:txBody>
+      </p:sp>
+      <p:sp>
+        <p:nvSpPr>
+          <p:cNvPr id="57" name="Rectangle 56"/>
+          <p:cNvSpPr/>
+          <p:nvPr/>
+        </p:nvSpPr>
+        <p:spPr>
+          <a:xfrm>
+            <a:off x="9473818" y="3769760"/>
+            <a:ext cx="110847" cy="111614"/>
+          </a:xfrm>
+          <a:prstGeom prst="rect">
+            <a:avLst/>
+          </a:prstGeom>
+          <a:solidFill>
+            <a:srgbClr val="FF0000"/>
+          </a:solidFill>
+          <a:ln>
+            <a:solidFill>
+              <a:schemeClr val="tx1"/>
+            </a:solidFill>
+          </a:ln>
+        </p:spPr>
+        <p:style>
+          <a:lnRef idx="2">
+            <a:schemeClr val="accent1">
+              <a:shade val="50000"/>
+            </a:schemeClr>
+          </a:lnRef>
+          <a:fillRef idx="1">
+            <a:schemeClr val="accent1"/>
+          </a:fillRef>
+          <a:effectRef idx="0">
+            <a:schemeClr val="accent1"/>
+          </a:effectRef>
+          <a:fontRef idx="minor">
+            <a:schemeClr val="lt1"/>
+          </a:fontRef>
+        </p:style>
+        <p:txBody>
+          <a:bodyPr rtlCol="0" anchor="ctr"/>
+          <a:lstStyle/>
+          <a:p>
+            <a:pPr algn="ctr"/>
+            <a:endParaRPr lang="en-CA"/>
+          </a:p>
+        </p:txBody>
+      </p:sp>
+      <p:sp>
+        <p:nvSpPr>
+          <p:cNvPr id="58" name="Rectangle 57"/>
+          <p:cNvSpPr/>
+          <p:nvPr/>
+        </p:nvSpPr>
+        <p:spPr>
+          <a:xfrm>
+            <a:off x="9686462" y="3949286"/>
+            <a:ext cx="110847" cy="111614"/>
+          </a:xfrm>
+          <a:prstGeom prst="rect">
+            <a:avLst/>
+          </a:prstGeom>
+          <a:solidFill>
+            <a:srgbClr val="FF0000"/>
+          </a:solidFill>
+          <a:ln>
+            <a:solidFill>
+              <a:schemeClr val="tx1"/>
+            </a:solidFill>
+          </a:ln>
+        </p:spPr>
+        <p:style>
+          <a:lnRef idx="2">
+            <a:schemeClr val="accent1">
+              <a:shade val="50000"/>
+            </a:schemeClr>
+          </a:lnRef>
+          <a:fillRef idx="1">
+            <a:schemeClr val="accent1"/>
+          </a:fillRef>
+          <a:effectRef idx="0">
+            <a:schemeClr val="accent1"/>
+          </a:effectRef>
+          <a:fontRef idx="minor">
+            <a:schemeClr val="lt1"/>
+          </a:fontRef>
+        </p:style>
+        <p:txBody>
+          <a:bodyPr rtlCol="0" anchor="ctr"/>
+          <a:lstStyle/>
+          <a:p>
+            <a:pPr algn="ctr"/>
+            <a:endParaRPr lang="en-CA"/>
+          </a:p>
+        </p:txBody>
+      </p:sp>
+      <p:sp>
+        <p:nvSpPr>
+          <p:cNvPr id="59" name="Rectangle 58"/>
+          <p:cNvSpPr/>
+          <p:nvPr/>
+        </p:nvSpPr>
+        <p:spPr>
+          <a:xfrm>
+            <a:off x="9473818" y="3941998"/>
+            <a:ext cx="110847" cy="111614"/>
+          </a:xfrm>
+          <a:prstGeom prst="rect">
+            <a:avLst/>
+          </a:prstGeom>
+          <a:solidFill>
+            <a:srgbClr val="FF0000"/>
+          </a:solidFill>
+          <a:ln>
+            <a:solidFill>
+              <a:schemeClr val="tx1"/>
+            </a:solidFill>
+          </a:ln>
+        </p:spPr>
+        <p:style>
+          <a:lnRef idx="2">
+            <a:schemeClr val="accent1">
+              <a:shade val="50000"/>
+            </a:schemeClr>
+          </a:lnRef>
+          <a:fillRef idx="1">
+            <a:schemeClr val="accent1"/>
+          </a:fillRef>
+          <a:effectRef idx="0">
+            <a:schemeClr val="accent1"/>
+          </a:effectRef>
+          <a:fontRef idx="minor">
+            <a:schemeClr val="lt1"/>
+          </a:fontRef>
+        </p:style>
+        <p:txBody>
+          <a:bodyPr rtlCol="0" anchor="ctr"/>
+          <a:lstStyle/>
+          <a:p>
+            <a:pPr algn="ctr"/>
+            <a:endParaRPr lang="en-CA"/>
           </a:p>
         </p:txBody>
       </p:sp>

</xml_diff>